<commit_message>
introduce formal meta model
</commit_message>
<xml_diff>
--- a/engine.pptx
+++ b/engine.pptx
@@ -8,8 +8,10 @@
     <p:sldId id="292" r:id="rId4"/>
     <p:sldId id="296" r:id="rId5"/>
     <p:sldId id="297" r:id="rId6"/>
-    <p:sldId id="295" r:id="rId7"/>
-    <p:sldId id="294" r:id="rId8"/>
+    <p:sldId id="299" r:id="rId7"/>
+    <p:sldId id="295" r:id="rId8"/>
+    <p:sldId id="294" r:id="rId9"/>
+    <p:sldId id="298" r:id="rId10"/>
   </p:sldIdLst>
   <p:sldSz cx="12192000" cy="6858000"/>
   <p:notesSz cx="6858000" cy="9144000"/>
@@ -265,7 +267,7 @@
           <a:p>
             <a:fld id="{BEEC5A5A-C34E-462D-A18F-97AFFCCC6197}" type="datetimeFigureOut">
               <a:rPr lang="en-NL" smtClean="0"/>
-              <a:t>01/15/2024</a:t>
+              <a:t>01/16/2024</a:t>
             </a:fld>
             <a:endParaRPr lang="en-NL"/>
           </a:p>
@@ -465,7 +467,7 @@
           <a:p>
             <a:fld id="{BEEC5A5A-C34E-462D-A18F-97AFFCCC6197}" type="datetimeFigureOut">
               <a:rPr lang="en-NL" smtClean="0"/>
-              <a:t>01/15/2024</a:t>
+              <a:t>01/16/2024</a:t>
             </a:fld>
             <a:endParaRPr lang="en-NL"/>
           </a:p>
@@ -675,7 +677,7 @@
           <a:p>
             <a:fld id="{BEEC5A5A-C34E-462D-A18F-97AFFCCC6197}" type="datetimeFigureOut">
               <a:rPr lang="en-NL" smtClean="0"/>
-              <a:t>01/15/2024</a:t>
+              <a:t>01/16/2024</a:t>
             </a:fld>
             <a:endParaRPr lang="en-NL"/>
           </a:p>
@@ -875,7 +877,7 @@
           <a:p>
             <a:fld id="{BEEC5A5A-C34E-462D-A18F-97AFFCCC6197}" type="datetimeFigureOut">
               <a:rPr lang="en-NL" smtClean="0"/>
-              <a:t>01/15/2024</a:t>
+              <a:t>01/16/2024</a:t>
             </a:fld>
             <a:endParaRPr lang="en-NL"/>
           </a:p>
@@ -1151,7 +1153,7 @@
           <a:p>
             <a:fld id="{BEEC5A5A-C34E-462D-A18F-97AFFCCC6197}" type="datetimeFigureOut">
               <a:rPr lang="en-NL" smtClean="0"/>
-              <a:t>01/15/2024</a:t>
+              <a:t>01/16/2024</a:t>
             </a:fld>
             <a:endParaRPr lang="en-NL"/>
           </a:p>
@@ -1419,7 +1421,7 @@
           <a:p>
             <a:fld id="{BEEC5A5A-C34E-462D-A18F-97AFFCCC6197}" type="datetimeFigureOut">
               <a:rPr lang="en-NL" smtClean="0"/>
-              <a:t>01/15/2024</a:t>
+              <a:t>01/16/2024</a:t>
             </a:fld>
             <a:endParaRPr lang="en-NL"/>
           </a:p>
@@ -1834,7 +1836,7 @@
           <a:p>
             <a:fld id="{BEEC5A5A-C34E-462D-A18F-97AFFCCC6197}" type="datetimeFigureOut">
               <a:rPr lang="en-NL" smtClean="0"/>
-              <a:t>01/15/2024</a:t>
+              <a:t>01/16/2024</a:t>
             </a:fld>
             <a:endParaRPr lang="en-NL"/>
           </a:p>
@@ -1976,7 +1978,7 @@
           <a:p>
             <a:fld id="{BEEC5A5A-C34E-462D-A18F-97AFFCCC6197}" type="datetimeFigureOut">
               <a:rPr lang="en-NL" smtClean="0"/>
-              <a:t>01/15/2024</a:t>
+              <a:t>01/16/2024</a:t>
             </a:fld>
             <a:endParaRPr lang="en-NL"/>
           </a:p>
@@ -2089,7 +2091,7 @@
           <a:p>
             <a:fld id="{BEEC5A5A-C34E-462D-A18F-97AFFCCC6197}" type="datetimeFigureOut">
               <a:rPr lang="en-NL" smtClean="0"/>
-              <a:t>01/15/2024</a:t>
+              <a:t>01/16/2024</a:t>
             </a:fld>
             <a:endParaRPr lang="en-NL"/>
           </a:p>
@@ -2402,7 +2404,7 @@
           <a:p>
             <a:fld id="{BEEC5A5A-C34E-462D-A18F-97AFFCCC6197}" type="datetimeFigureOut">
               <a:rPr lang="en-NL" smtClean="0"/>
-              <a:t>01/15/2024</a:t>
+              <a:t>01/16/2024</a:t>
             </a:fld>
             <a:endParaRPr lang="en-NL"/>
           </a:p>
@@ -2691,7 +2693,7 @@
           <a:p>
             <a:fld id="{BEEC5A5A-C34E-462D-A18F-97AFFCCC6197}" type="datetimeFigureOut">
               <a:rPr lang="en-NL" smtClean="0"/>
-              <a:t>01/15/2024</a:t>
+              <a:t>01/16/2024</a:t>
             </a:fld>
             <a:endParaRPr lang="en-NL"/>
           </a:p>
@@ -2934,7 +2936,7 @@
           <a:p>
             <a:fld id="{BEEC5A5A-C34E-462D-A18F-97AFFCCC6197}" type="datetimeFigureOut">
               <a:rPr lang="en-NL" smtClean="0"/>
-              <a:t>01/15/2024</a:t>
+              <a:t>01/16/2024</a:t>
             </a:fld>
             <a:endParaRPr lang="en-NL"/>
           </a:p>
@@ -6848,7 +6850,7 @@
         <p:spPr>
           <a:xfrm>
             <a:off x="174875" y="40027"/>
-            <a:ext cx="4756559" cy="1015663"/>
+            <a:ext cx="6709209" cy="1015663"/>
           </a:xfrm>
           <a:prstGeom prst="rect">
             <a:avLst/>
@@ -6869,7 +6871,7 @@
           <a:p>
             <a:r>
               <a:rPr lang="en-US" dirty="0"/>
-              <a:t>(separate phases into dedicated graph elements)</a:t>
+              <a:t>(separate phases of an internal object into dedicated graph elements)</a:t>
             </a:r>
           </a:p>
           <a:p>
@@ -9120,7 +9122,7 @@
           <p:cNvPr id="2" name="TextBox 1">
             <a:extLst>
               <a:ext uri="{FF2B5EF4-FFF2-40B4-BE49-F238E27FC236}">
-                <a16:creationId xmlns:a16="http://schemas.microsoft.com/office/drawing/2014/main" id="{C027B8CF-6ADE-9A6F-1748-657A658E3F55}"/>
+                <a16:creationId xmlns:a16="http://schemas.microsoft.com/office/drawing/2014/main" id="{71997F6E-8C41-46E9-D991-451286F26E6E}"/>
               </a:ext>
             </a:extLst>
           </p:cNvPr>
@@ -9129,8 +9131,8 @@
         </p:nvSpPr>
         <p:spPr>
           <a:xfrm>
-            <a:off x="79095" y="0"/>
-            <a:ext cx="2523448" cy="738664"/>
+            <a:off x="174875" y="40027"/>
+            <a:ext cx="6709209" cy="1015663"/>
           </a:xfrm>
           <a:prstGeom prst="rect">
             <a:avLst/>
@@ -9145,72 +9147,432 @@
           <a:p>
             <a:r>
               <a:rPr lang="en-US" sz="2400" dirty="0"/>
-              <a:t>Namespace Model</a:t>
+              <a:t>Abstract Engine Meta Model</a:t>
             </a:r>
           </a:p>
           <a:p>
             <a:r>
               <a:rPr lang="en-US" dirty="0"/>
-              <a:t>only local graphs</a:t>
-            </a:r>
+              <a:t>(separate phases of an internal object  into dedicated graph elements)</a:t>
+            </a:r>
+          </a:p>
+          <a:p>
             <a:endParaRPr lang="en-DE" dirty="0"/>
           </a:p>
         </p:txBody>
       </p:sp>
-      <p:sp>
-        <p:nvSpPr>
-          <p:cNvPr id="3" name="Rectangle 2">
-            <a:extLst>
-              <a:ext uri="{FF2B5EF4-FFF2-40B4-BE49-F238E27FC236}">
-                <a16:creationId xmlns:a16="http://schemas.microsoft.com/office/drawing/2014/main" id="{E91B7A0B-7D4F-424C-5329-C5450CF470F1}"/>
-              </a:ext>
-            </a:extLst>
-          </p:cNvPr>
-          <p:cNvSpPr/>
-          <p:nvPr/>
-        </p:nvSpPr>
-        <p:spPr>
-          <a:xfrm>
-            <a:off x="1582615" y="1746738"/>
-            <a:ext cx="9460523" cy="4267200"/>
-          </a:xfrm>
-          <a:prstGeom prst="rect">
-            <a:avLst/>
-          </a:prstGeom>
-          <a:noFill/>
-          <a:ln w="25400"/>
+      <p:grpSp>
+        <p:nvGrpSpPr>
+          <p:cNvPr id="9" name="Group 8">
+            <a:extLst>
+              <a:ext uri="{FF2B5EF4-FFF2-40B4-BE49-F238E27FC236}">
+                <a16:creationId xmlns:a16="http://schemas.microsoft.com/office/drawing/2014/main" id="{8509CB35-CF00-0AE1-2D9A-7CABC5A9A9A4}"/>
+              </a:ext>
+            </a:extLst>
+          </p:cNvPr>
+          <p:cNvGrpSpPr/>
+          <p:nvPr/>
+        </p:nvGrpSpPr>
+        <p:grpSpPr>
+          <a:xfrm>
+            <a:off x="8367125" y="2365712"/>
+            <a:ext cx="1272746" cy="667265"/>
+            <a:chOff x="7451124" y="1272746"/>
+            <a:chExt cx="1272746" cy="667265"/>
+          </a:xfrm>
+        </p:grpSpPr>
+        <p:sp>
+          <p:nvSpPr>
+            <p:cNvPr id="10" name="Rectangle: Rounded Corners 9">
+              <a:extLst>
+                <a:ext uri="{FF2B5EF4-FFF2-40B4-BE49-F238E27FC236}">
+                  <a16:creationId xmlns:a16="http://schemas.microsoft.com/office/drawing/2014/main" id="{2CDE7913-15EB-B227-3C42-FAB5ABA4DC1E}"/>
+                </a:ext>
+              </a:extLst>
+            </p:cNvPr>
+            <p:cNvSpPr/>
+            <p:nvPr/>
+          </p:nvSpPr>
+          <p:spPr>
+            <a:xfrm>
+              <a:off x="7451124" y="1272746"/>
+              <a:ext cx="1272746" cy="667265"/>
+            </a:xfrm>
+            <a:prstGeom prst="roundRect">
+              <a:avLst/>
+            </a:prstGeom>
+            <a:solidFill>
+              <a:schemeClr val="accent1">
+                <a:lumMod val="60000"/>
+                <a:lumOff val="40000"/>
+              </a:schemeClr>
+            </a:solidFill>
+            <a:ln w="25400">
+              <a:solidFill>
+                <a:schemeClr val="accent1">
+                  <a:lumMod val="75000"/>
+                </a:schemeClr>
+              </a:solidFill>
+              <a:prstDash val="dash"/>
+            </a:ln>
+          </p:spPr>
+          <p:style>
+            <a:lnRef idx="2">
+              <a:schemeClr val="accent1">
+                <a:shade val="50000"/>
+              </a:schemeClr>
+            </a:lnRef>
+            <a:fillRef idx="1">
+              <a:schemeClr val="accent1"/>
+            </a:fillRef>
+            <a:effectRef idx="0">
+              <a:schemeClr val="accent1"/>
+            </a:effectRef>
+            <a:fontRef idx="minor">
+              <a:schemeClr val="lt1"/>
+            </a:fontRef>
+          </p:style>
+          <p:txBody>
+            <a:bodyPr rtlCol="0" anchor="ctr"/>
+            <a:lstStyle/>
+            <a:p>
+              <a:pPr algn="ctr"/>
+              <a:endParaRPr lang="en-DE"/>
+            </a:p>
+          </p:txBody>
+        </p:sp>
+        <p:sp>
+          <p:nvSpPr>
+            <p:cNvPr id="11" name="TextBox 10">
+              <a:extLst>
+                <a:ext uri="{FF2B5EF4-FFF2-40B4-BE49-F238E27FC236}">
+                  <a16:creationId xmlns:a16="http://schemas.microsoft.com/office/drawing/2014/main" id="{120AD6FA-149E-C39E-EF82-AAC240EA9B98}"/>
+                </a:ext>
+              </a:extLst>
+            </p:cNvPr>
+            <p:cNvSpPr txBox="1"/>
+            <p:nvPr/>
+          </p:nvSpPr>
+          <p:spPr>
+            <a:xfrm>
+              <a:off x="7710538" y="1421712"/>
+              <a:ext cx="753924" cy="369332"/>
+            </a:xfrm>
+            <a:prstGeom prst="rect">
+              <a:avLst/>
+            </a:prstGeom>
+            <a:noFill/>
+          </p:spPr>
+          <p:txBody>
+            <a:bodyPr wrap="none" rtlCol="0">
+              <a:spAutoFit/>
+            </a:bodyPr>
+            <a:lstStyle/>
+            <a:p>
+              <a:pPr algn="ctr"/>
+              <a:r>
+                <a:rPr lang="en-US" dirty="0"/>
+                <a:t>Intern</a:t>
+              </a:r>
+              <a:endParaRPr lang="en-DE" dirty="0"/>
+            </a:p>
+          </p:txBody>
+        </p:sp>
+      </p:grpSp>
+      <p:grpSp>
+        <p:nvGrpSpPr>
+          <p:cNvPr id="14" name="Group 13">
+            <a:extLst>
+              <a:ext uri="{FF2B5EF4-FFF2-40B4-BE49-F238E27FC236}">
+                <a16:creationId xmlns:a16="http://schemas.microsoft.com/office/drawing/2014/main" id="{4B653C0E-F534-BEF4-19AA-6D931A32C634}"/>
+              </a:ext>
+            </a:extLst>
+          </p:cNvPr>
+          <p:cNvGrpSpPr/>
+          <p:nvPr/>
+        </p:nvGrpSpPr>
+        <p:grpSpPr>
+          <a:xfrm>
+            <a:off x="4886762" y="2341790"/>
+            <a:ext cx="1336431" cy="715108"/>
+            <a:chOff x="2872154" y="1817077"/>
+            <a:chExt cx="1336431" cy="715108"/>
+          </a:xfrm>
+        </p:grpSpPr>
+        <p:sp>
+          <p:nvSpPr>
+            <p:cNvPr id="16" name="Oval 15">
+              <a:extLst>
+                <a:ext uri="{FF2B5EF4-FFF2-40B4-BE49-F238E27FC236}">
+                  <a16:creationId xmlns:a16="http://schemas.microsoft.com/office/drawing/2014/main" id="{39CCAEC5-D361-A1B4-BB6F-EBAACE503F9B}"/>
+                </a:ext>
+              </a:extLst>
+            </p:cNvPr>
+            <p:cNvSpPr/>
+            <p:nvPr/>
+          </p:nvSpPr>
+          <p:spPr>
+            <a:xfrm>
+              <a:off x="2872154" y="1817077"/>
+              <a:ext cx="1336431" cy="715108"/>
+            </a:xfrm>
+            <a:prstGeom prst="ellipse">
+              <a:avLst/>
+            </a:prstGeom>
+            <a:solidFill>
+              <a:schemeClr val="accent4"/>
+            </a:solidFill>
+            <a:ln w="25400">
+              <a:solidFill>
+                <a:schemeClr val="accent4">
+                  <a:lumMod val="50000"/>
+                </a:schemeClr>
+              </a:solidFill>
+              <a:prstDash val="dash"/>
+            </a:ln>
+          </p:spPr>
+          <p:style>
+            <a:lnRef idx="2">
+              <a:schemeClr val="accent1">
+                <a:shade val="50000"/>
+              </a:schemeClr>
+            </a:lnRef>
+            <a:fillRef idx="1">
+              <a:schemeClr val="accent1"/>
+            </a:fillRef>
+            <a:effectRef idx="0">
+              <a:schemeClr val="accent1"/>
+            </a:effectRef>
+            <a:fontRef idx="minor">
+              <a:schemeClr val="lt1"/>
+            </a:fontRef>
+          </p:style>
+          <p:txBody>
+            <a:bodyPr rtlCol="0" anchor="ctr"/>
+            <a:lstStyle/>
+            <a:p>
+              <a:pPr algn="ctr"/>
+              <a:endParaRPr lang="en-DE"/>
+            </a:p>
+          </p:txBody>
+        </p:sp>
+        <p:sp>
+          <p:nvSpPr>
+            <p:cNvPr id="20" name="TextBox 19">
+              <a:extLst>
+                <a:ext uri="{FF2B5EF4-FFF2-40B4-BE49-F238E27FC236}">
+                  <a16:creationId xmlns:a16="http://schemas.microsoft.com/office/drawing/2014/main" id="{73D71CB7-7CCE-6FF7-CC8A-B2B6E3E5F3AD}"/>
+                </a:ext>
+              </a:extLst>
+            </p:cNvPr>
+            <p:cNvSpPr txBox="1"/>
+            <p:nvPr/>
+          </p:nvSpPr>
+          <p:spPr>
+            <a:xfrm>
+              <a:off x="3059564" y="1851466"/>
+              <a:ext cx="961610" cy="646331"/>
+            </a:xfrm>
+            <a:prstGeom prst="rect">
+              <a:avLst/>
+            </a:prstGeom>
+            <a:noFill/>
+          </p:spPr>
+          <p:txBody>
+            <a:bodyPr wrap="none" rtlCol="0">
+              <a:spAutoFit/>
+            </a:bodyPr>
+            <a:lstStyle/>
+            <a:p>
+              <a:pPr algn="ctr"/>
+              <a:r>
+                <a:rPr lang="en-US" dirty="0"/>
+                <a:t>Element</a:t>
+              </a:r>
+            </a:p>
+            <a:p>
+              <a:pPr algn="ctr"/>
+              <a:r>
+                <a:rPr lang="en-US" dirty="0"/>
+                <a:t>(type)</a:t>
+              </a:r>
+              <a:endParaRPr lang="en-DE" dirty="0"/>
+            </a:p>
+          </p:txBody>
+        </p:sp>
+      </p:grpSp>
+      <p:grpSp>
+        <p:nvGrpSpPr>
+          <p:cNvPr id="22" name="Group 21">
+            <a:extLst>
+              <a:ext uri="{FF2B5EF4-FFF2-40B4-BE49-F238E27FC236}">
+                <a16:creationId xmlns:a16="http://schemas.microsoft.com/office/drawing/2014/main" id="{BC9CA4EC-2C23-5741-8939-7A3A0C4409A0}"/>
+              </a:ext>
+            </a:extLst>
+          </p:cNvPr>
+          <p:cNvGrpSpPr/>
+          <p:nvPr/>
+        </p:nvGrpSpPr>
+        <p:grpSpPr>
+          <a:xfrm>
+            <a:off x="1602763" y="2365712"/>
+            <a:ext cx="1272746" cy="667265"/>
+            <a:chOff x="7451124" y="1272746"/>
+            <a:chExt cx="1272746" cy="667265"/>
+          </a:xfrm>
+        </p:grpSpPr>
+        <p:sp>
+          <p:nvSpPr>
+            <p:cNvPr id="23" name="Rectangle: Rounded Corners 22">
+              <a:extLst>
+                <a:ext uri="{FF2B5EF4-FFF2-40B4-BE49-F238E27FC236}">
+                  <a16:creationId xmlns:a16="http://schemas.microsoft.com/office/drawing/2014/main" id="{9BD3C506-2B37-F804-7FE1-1959116272F3}"/>
+                </a:ext>
+              </a:extLst>
+            </p:cNvPr>
+            <p:cNvSpPr/>
+            <p:nvPr/>
+          </p:nvSpPr>
+          <p:spPr>
+            <a:xfrm>
+              <a:off x="7451124" y="1272746"/>
+              <a:ext cx="1272746" cy="667265"/>
+            </a:xfrm>
+            <a:prstGeom prst="roundRect">
+              <a:avLst/>
+            </a:prstGeom>
+            <a:solidFill>
+              <a:schemeClr val="accent1">
+                <a:lumMod val="40000"/>
+                <a:lumOff val="60000"/>
+              </a:schemeClr>
+            </a:solidFill>
+            <a:ln w="25400">
+              <a:solidFill>
+                <a:schemeClr val="accent1">
+                  <a:lumMod val="75000"/>
+                </a:schemeClr>
+              </a:solidFill>
+              <a:prstDash val="dash"/>
+            </a:ln>
+          </p:spPr>
+          <p:style>
+            <a:lnRef idx="2">
+              <a:schemeClr val="accent1">
+                <a:shade val="50000"/>
+              </a:schemeClr>
+            </a:lnRef>
+            <a:fillRef idx="1">
+              <a:schemeClr val="accent1"/>
+            </a:fillRef>
+            <a:effectRef idx="0">
+              <a:schemeClr val="accent1"/>
+            </a:effectRef>
+            <a:fontRef idx="minor">
+              <a:schemeClr val="lt1"/>
+            </a:fontRef>
+          </p:style>
+          <p:txBody>
+            <a:bodyPr rtlCol="0" anchor="ctr"/>
+            <a:lstStyle/>
+            <a:p>
+              <a:pPr algn="ctr"/>
+              <a:endParaRPr lang="en-DE"/>
+            </a:p>
+          </p:txBody>
+        </p:sp>
+        <p:sp>
+          <p:nvSpPr>
+            <p:cNvPr id="29" name="TextBox 28">
+              <a:extLst>
+                <a:ext uri="{FF2B5EF4-FFF2-40B4-BE49-F238E27FC236}">
+                  <a16:creationId xmlns:a16="http://schemas.microsoft.com/office/drawing/2014/main" id="{10281F2F-5A62-F7C2-CCE5-295982043A82}"/>
+                </a:ext>
+              </a:extLst>
+            </p:cNvPr>
+            <p:cNvSpPr txBox="1"/>
+            <p:nvPr/>
+          </p:nvSpPr>
+          <p:spPr>
+            <a:xfrm>
+              <a:off x="7693093" y="1421712"/>
+              <a:ext cx="788807" cy="369332"/>
+            </a:xfrm>
+            <a:prstGeom prst="rect">
+              <a:avLst/>
+            </a:prstGeom>
+            <a:noFill/>
+          </p:spPr>
+          <p:txBody>
+            <a:bodyPr wrap="none" rtlCol="0">
+              <a:spAutoFit/>
+            </a:bodyPr>
+            <a:lstStyle/>
+            <a:p>
+              <a:pPr algn="ctr"/>
+              <a:r>
+                <a:rPr lang="en-US" dirty="0"/>
+                <a:t>Extern</a:t>
+              </a:r>
+              <a:endParaRPr lang="en-DE" dirty="0"/>
+            </a:p>
+          </p:txBody>
+        </p:sp>
+      </p:grpSp>
+      <p:cxnSp>
+        <p:nvCxnSpPr>
+          <p:cNvPr id="30" name="Straight Arrow Connector 29">
+            <a:extLst>
+              <a:ext uri="{FF2B5EF4-FFF2-40B4-BE49-F238E27FC236}">
+                <a16:creationId xmlns:a16="http://schemas.microsoft.com/office/drawing/2014/main" id="{95BCDF94-4363-0EFE-2B82-EC853EEF192B}"/>
+              </a:ext>
+            </a:extLst>
+          </p:cNvPr>
+          <p:cNvCxnSpPr>
+            <a:cxnSpLocks/>
+            <a:stCxn id="16" idx="6"/>
+            <a:endCxn id="10" idx="1"/>
+          </p:cNvCxnSpPr>
+          <p:nvPr/>
+        </p:nvCxnSpPr>
+        <p:spPr>
+          <a:xfrm>
+            <a:off x="6223193" y="2699344"/>
+            <a:ext cx="2143932" cy="1"/>
+          </a:xfrm>
+          <a:prstGeom prst="straightConnector1">
+            <a:avLst/>
+          </a:prstGeom>
+          <a:ln w="25400">
+            <a:solidFill>
+              <a:schemeClr val="accent1">
+                <a:lumMod val="75000"/>
+              </a:schemeClr>
+            </a:solidFill>
+            <a:tailEnd type="stealth" w="lg" len="lg"/>
+          </a:ln>
         </p:spPr>
         <p:style>
-          <a:lnRef idx="2">
-            <a:schemeClr val="accent1">
-              <a:shade val="50000"/>
-            </a:schemeClr>
+          <a:lnRef idx="1">
+            <a:schemeClr val="accent1"/>
           </a:lnRef>
-          <a:fillRef idx="1">
+          <a:fillRef idx="0">
             <a:schemeClr val="accent1"/>
           </a:fillRef>
           <a:effectRef idx="0">
             <a:schemeClr val="accent1"/>
           </a:effectRef>
           <a:fontRef idx="minor">
-            <a:schemeClr val="lt1"/>
+            <a:schemeClr val="tx1"/>
           </a:fontRef>
         </p:style>
-        <p:txBody>
-          <a:bodyPr rtlCol="0" anchor="ctr"/>
-          <a:lstStyle/>
-          <a:p>
-            <a:pPr algn="ctr"/>
-            <a:endParaRPr lang="en-DE"/>
-          </a:p>
-        </p:txBody>
-      </p:sp>
-      <p:sp>
-        <p:nvSpPr>
-          <p:cNvPr id="4" name="Oval 3">
-            <a:extLst>
-              <a:ext uri="{FF2B5EF4-FFF2-40B4-BE49-F238E27FC236}">
-                <a16:creationId xmlns:a16="http://schemas.microsoft.com/office/drawing/2014/main" id="{22E12FB6-54CD-121B-C35C-DD54827539C2}"/>
+      </p:cxnSp>
+      <p:sp>
+        <p:nvSpPr>
+          <p:cNvPr id="35" name="Arc 34">
+            <a:extLst>
+              <a:ext uri="{FF2B5EF4-FFF2-40B4-BE49-F238E27FC236}">
+                <a16:creationId xmlns:a16="http://schemas.microsoft.com/office/drawing/2014/main" id="{9C3FC11A-5306-9375-F91F-AF4A6BF67328}"/>
               </a:ext>
             </a:extLst>
           </p:cNvPr>
@@ -9219,37 +9581,36 @@
         </p:nvSpPr>
         <p:spPr>
           <a:xfrm>
-            <a:off x="2918968" y="2533336"/>
-            <a:ext cx="520700" cy="520700"/>
-          </a:xfrm>
-          <a:prstGeom prst="ellipse">
-            <a:avLst/>
-          </a:prstGeom>
-          <a:solidFill>
-            <a:schemeClr val="accent4"/>
-          </a:solidFill>
+            <a:off x="5323160" y="2016729"/>
+            <a:ext cx="527926" cy="718900"/>
+          </a:xfrm>
+          <a:prstGeom prst="arc">
+            <a:avLst>
+              <a:gd name="adj1" fmla="val 10894774"/>
+              <a:gd name="adj2" fmla="val 0"/>
+            </a:avLst>
+          </a:prstGeom>
           <a:ln w="25400">
             <a:solidFill>
               <a:schemeClr val="accent4">
                 <a:lumMod val="75000"/>
               </a:schemeClr>
             </a:solidFill>
+            <a:tailEnd type="triangle" w="lg" len="lg"/>
           </a:ln>
         </p:spPr>
         <p:style>
-          <a:lnRef idx="2">
-            <a:schemeClr val="accent1">
-              <a:shade val="50000"/>
-            </a:schemeClr>
+          <a:lnRef idx="1">
+            <a:schemeClr val="accent1"/>
           </a:lnRef>
-          <a:fillRef idx="1">
+          <a:fillRef idx="0">
             <a:schemeClr val="accent1"/>
           </a:fillRef>
           <a:effectRef idx="0">
             <a:schemeClr val="accent1"/>
           </a:effectRef>
           <a:fontRef idx="minor">
-            <a:schemeClr val="lt1"/>
+            <a:schemeClr val="tx1"/>
           </a:fontRef>
         </p:style>
         <p:txBody>
@@ -9261,276 +9622,62 @@
           </a:p>
         </p:txBody>
       </p:sp>
-      <p:sp>
-        <p:nvSpPr>
-          <p:cNvPr id="5" name="Diamond 4">
-            <a:extLst>
-              <a:ext uri="{FF2B5EF4-FFF2-40B4-BE49-F238E27FC236}">
-                <a16:creationId xmlns:a16="http://schemas.microsoft.com/office/drawing/2014/main" id="{CD82E4D5-5F0A-A0F2-8BA1-5F647230BEAA}"/>
-              </a:ext>
-            </a:extLst>
-          </p:cNvPr>
-          <p:cNvSpPr/>
-          <p:nvPr/>
-        </p:nvSpPr>
-        <p:spPr>
-          <a:xfrm>
-            <a:off x="2314154" y="4358675"/>
-            <a:ext cx="576776" cy="576776"/>
-          </a:xfrm>
-          <a:prstGeom prst="diamond">
-            <a:avLst/>
-          </a:prstGeom>
-          <a:solidFill>
-            <a:schemeClr val="accent4"/>
-          </a:solidFill>
+      <p:cxnSp>
+        <p:nvCxnSpPr>
+          <p:cNvPr id="36" name="Straight Arrow Connector 35">
+            <a:extLst>
+              <a:ext uri="{FF2B5EF4-FFF2-40B4-BE49-F238E27FC236}">
+                <a16:creationId xmlns:a16="http://schemas.microsoft.com/office/drawing/2014/main" id="{836BA768-EDBC-AE79-0F92-3DB3098A7647}"/>
+              </a:ext>
+            </a:extLst>
+          </p:cNvPr>
+          <p:cNvCxnSpPr>
+            <a:cxnSpLocks/>
+            <a:stCxn id="23" idx="3"/>
+            <a:endCxn id="16" idx="2"/>
+          </p:cNvCxnSpPr>
+          <p:nvPr/>
+        </p:nvCxnSpPr>
+        <p:spPr>
+          <a:xfrm flipV="1">
+            <a:off x="2875509" y="2699344"/>
+            <a:ext cx="2011253" cy="1"/>
+          </a:xfrm>
+          <a:prstGeom prst="straightConnector1">
+            <a:avLst/>
+          </a:prstGeom>
           <a:ln w="25400">
             <a:solidFill>
-              <a:schemeClr val="accent4">
-                <a:lumMod val="75000"/>
+              <a:schemeClr val="accent1">
+                <a:lumMod val="40000"/>
+                <a:lumOff val="60000"/>
               </a:schemeClr>
             </a:solidFill>
+            <a:headEnd type="none"/>
+            <a:tailEnd type="arrow" w="lg" len="lg"/>
           </a:ln>
         </p:spPr>
         <p:style>
-          <a:lnRef idx="2">
-            <a:schemeClr val="accent1">
-              <a:shade val="50000"/>
-            </a:schemeClr>
+          <a:lnRef idx="1">
+            <a:schemeClr val="accent1"/>
           </a:lnRef>
-          <a:fillRef idx="1">
+          <a:fillRef idx="0">
             <a:schemeClr val="accent1"/>
           </a:fillRef>
           <a:effectRef idx="0">
             <a:schemeClr val="accent1"/>
           </a:effectRef>
           <a:fontRef idx="minor">
-            <a:schemeClr val="lt1"/>
+            <a:schemeClr val="tx1"/>
           </a:fontRef>
         </p:style>
-        <p:txBody>
-          <a:bodyPr rtlCol="0" anchor="ctr"/>
-          <a:lstStyle/>
-          <a:p>
-            <a:pPr algn="ctr"/>
-            <a:endParaRPr lang="en-DE"/>
-          </a:p>
-        </p:txBody>
-      </p:sp>
-      <p:sp>
-        <p:nvSpPr>
-          <p:cNvPr id="6" name="Oval 5">
-            <a:extLst>
-              <a:ext uri="{FF2B5EF4-FFF2-40B4-BE49-F238E27FC236}">
-                <a16:creationId xmlns:a16="http://schemas.microsoft.com/office/drawing/2014/main" id="{8092B1EC-1F00-356C-93F7-7E4A320E2B52}"/>
-              </a:ext>
-            </a:extLst>
-          </p:cNvPr>
-          <p:cNvSpPr/>
-          <p:nvPr/>
-        </p:nvSpPr>
-        <p:spPr>
-          <a:xfrm>
-            <a:off x="3094814" y="3543615"/>
-            <a:ext cx="520700" cy="520700"/>
-          </a:xfrm>
-          <a:prstGeom prst="ellipse">
-            <a:avLst/>
-          </a:prstGeom>
-          <a:solidFill>
-            <a:schemeClr val="accent4"/>
-          </a:solidFill>
-          <a:ln w="25400">
-            <a:solidFill>
-              <a:schemeClr val="accent4">
-                <a:lumMod val="75000"/>
-              </a:schemeClr>
-            </a:solidFill>
-          </a:ln>
-        </p:spPr>
-        <p:style>
-          <a:lnRef idx="2">
-            <a:schemeClr val="accent1">
-              <a:shade val="50000"/>
-            </a:schemeClr>
-          </a:lnRef>
-          <a:fillRef idx="1">
-            <a:schemeClr val="accent1"/>
-          </a:fillRef>
-          <a:effectRef idx="0">
-            <a:schemeClr val="accent1"/>
-          </a:effectRef>
-          <a:fontRef idx="minor">
-            <a:schemeClr val="lt1"/>
-          </a:fontRef>
-        </p:style>
-        <p:txBody>
-          <a:bodyPr rtlCol="0" anchor="ctr"/>
-          <a:lstStyle/>
-          <a:p>
-            <a:pPr algn="ctr"/>
-            <a:endParaRPr lang="en-DE"/>
-          </a:p>
-        </p:txBody>
-      </p:sp>
-      <p:sp>
-        <p:nvSpPr>
-          <p:cNvPr id="7" name="Diamond 6">
-            <a:extLst>
-              <a:ext uri="{FF2B5EF4-FFF2-40B4-BE49-F238E27FC236}">
-                <a16:creationId xmlns:a16="http://schemas.microsoft.com/office/drawing/2014/main" id="{C619EA54-99F6-35B6-6A5B-BD134A10B46E}"/>
-              </a:ext>
-            </a:extLst>
-          </p:cNvPr>
-          <p:cNvSpPr/>
-          <p:nvPr/>
-        </p:nvSpPr>
-        <p:spPr>
-          <a:xfrm>
-            <a:off x="2185200" y="3107878"/>
-            <a:ext cx="576776" cy="576776"/>
-          </a:xfrm>
-          <a:prstGeom prst="diamond">
-            <a:avLst/>
-          </a:prstGeom>
-          <a:solidFill>
-            <a:schemeClr val="accent4"/>
-          </a:solidFill>
-          <a:ln w="25400">
-            <a:solidFill>
-              <a:schemeClr val="accent4">
-                <a:lumMod val="75000"/>
-              </a:schemeClr>
-            </a:solidFill>
-          </a:ln>
-        </p:spPr>
-        <p:style>
-          <a:lnRef idx="2">
-            <a:schemeClr val="accent1">
-              <a:shade val="50000"/>
-            </a:schemeClr>
-          </a:lnRef>
-          <a:fillRef idx="1">
-            <a:schemeClr val="accent1"/>
-          </a:fillRef>
-          <a:effectRef idx="0">
-            <a:schemeClr val="accent1"/>
-          </a:effectRef>
-          <a:fontRef idx="minor">
-            <a:schemeClr val="lt1"/>
-          </a:fontRef>
-        </p:style>
-        <p:txBody>
-          <a:bodyPr rtlCol="0" anchor="ctr"/>
-          <a:lstStyle/>
-          <a:p>
-            <a:pPr algn="ctr"/>
-            <a:endParaRPr lang="en-DE"/>
-          </a:p>
-        </p:txBody>
-      </p:sp>
-      <p:sp>
-        <p:nvSpPr>
-          <p:cNvPr id="8" name="Rectangle 7">
-            <a:extLst>
-              <a:ext uri="{FF2B5EF4-FFF2-40B4-BE49-F238E27FC236}">
-                <a16:creationId xmlns:a16="http://schemas.microsoft.com/office/drawing/2014/main" id="{43EB8EBF-CA85-0116-9091-BA57C6BA10BA}"/>
-              </a:ext>
-            </a:extLst>
-          </p:cNvPr>
-          <p:cNvSpPr/>
-          <p:nvPr/>
-        </p:nvSpPr>
-        <p:spPr>
-          <a:xfrm>
-            <a:off x="4776021" y="2093387"/>
-            <a:ext cx="5545015" cy="1661085"/>
-          </a:xfrm>
-          <a:prstGeom prst="rect">
-            <a:avLst/>
-          </a:prstGeom>
-          <a:noFill/>
-          <a:ln w="25400"/>
-        </p:spPr>
-        <p:style>
-          <a:lnRef idx="2">
-            <a:schemeClr val="accent1">
-              <a:shade val="50000"/>
-            </a:schemeClr>
-          </a:lnRef>
-          <a:fillRef idx="1">
-            <a:schemeClr val="accent1"/>
-          </a:fillRef>
-          <a:effectRef idx="0">
-            <a:schemeClr val="accent1"/>
-          </a:effectRef>
-          <a:fontRef idx="minor">
-            <a:schemeClr val="lt1"/>
-          </a:fontRef>
-        </p:style>
-        <p:txBody>
-          <a:bodyPr rtlCol="0" anchor="ctr"/>
-          <a:lstStyle/>
-          <a:p>
-            <a:pPr algn="ctr"/>
-            <a:endParaRPr lang="en-DE"/>
-          </a:p>
-        </p:txBody>
-      </p:sp>
-      <p:sp>
-        <p:nvSpPr>
-          <p:cNvPr id="9" name="Rectangle 8">
-            <a:extLst>
-              <a:ext uri="{FF2B5EF4-FFF2-40B4-BE49-F238E27FC236}">
-                <a16:creationId xmlns:a16="http://schemas.microsoft.com/office/drawing/2014/main" id="{8635AD2D-84BA-C541-EDA9-859F03E96DC4}"/>
-              </a:ext>
-            </a:extLst>
-          </p:cNvPr>
-          <p:cNvSpPr/>
-          <p:nvPr/>
-        </p:nvSpPr>
-        <p:spPr>
-          <a:xfrm>
-            <a:off x="4794759" y="4104908"/>
-            <a:ext cx="5545015" cy="1661085"/>
-          </a:xfrm>
-          <a:prstGeom prst="rect">
-            <a:avLst/>
-          </a:prstGeom>
-          <a:noFill/>
-          <a:ln w="25400"/>
-        </p:spPr>
-        <p:style>
-          <a:lnRef idx="2">
-            <a:schemeClr val="accent1">
-              <a:shade val="50000"/>
-            </a:schemeClr>
-          </a:lnRef>
-          <a:fillRef idx="1">
-            <a:schemeClr val="accent1"/>
-          </a:fillRef>
-          <a:effectRef idx="0">
-            <a:schemeClr val="accent1"/>
-          </a:effectRef>
-          <a:fontRef idx="minor">
-            <a:schemeClr val="lt1"/>
-          </a:fontRef>
-        </p:style>
-        <p:txBody>
-          <a:bodyPr rtlCol="0" anchor="ctr"/>
-          <a:lstStyle/>
-          <a:p>
-            <a:pPr algn="ctr"/>
-            <a:endParaRPr lang="en-DE"/>
-          </a:p>
-        </p:txBody>
-      </p:sp>
-      <p:sp>
-        <p:nvSpPr>
-          <p:cNvPr id="10" name="TextBox 9">
-            <a:extLst>
-              <a:ext uri="{FF2B5EF4-FFF2-40B4-BE49-F238E27FC236}">
-                <a16:creationId xmlns:a16="http://schemas.microsoft.com/office/drawing/2014/main" id="{BFB59EB4-6C25-71EA-9242-394017D041B8}"/>
+      </p:cxnSp>
+      <p:sp>
+        <p:nvSpPr>
+          <p:cNvPr id="43" name="TextBox 42">
+            <a:extLst>
+              <a:ext uri="{FF2B5EF4-FFF2-40B4-BE49-F238E27FC236}">
+                <a16:creationId xmlns:a16="http://schemas.microsoft.com/office/drawing/2014/main" id="{7257D624-F709-BBA6-2722-97E53ADBBAE9}"/>
               </a:ext>
             </a:extLst>
           </p:cNvPr>
@@ -9539,8 +9686,8 @@
         </p:nvSpPr>
         <p:spPr>
           <a:xfrm>
-            <a:off x="3347166" y="1072717"/>
-            <a:ext cx="2895152" cy="369332"/>
+            <a:off x="4463816" y="1401463"/>
+            <a:ext cx="1698094" cy="369332"/>
           </a:xfrm>
           <a:prstGeom prst="rect">
             <a:avLst/>
@@ -9556,7 +9703,7 @@
             <a:pPr algn="ctr"/>
             <a:r>
               <a:rPr lang="en-US" dirty="0"/>
-              <a:t>Hierarchical Identity   A/B/C</a:t>
+              <a:t>Phases of Intern</a:t>
             </a:r>
             <a:endParaRPr lang="en-DE" dirty="0"/>
           </a:p>
@@ -9564,68 +9711,10 @@
       </p:sp>
       <p:sp>
         <p:nvSpPr>
-          <p:cNvPr id="11" name="Rectangle: Rounded Corners 10">
-            <a:extLst>
-              <a:ext uri="{FF2B5EF4-FFF2-40B4-BE49-F238E27FC236}">
-                <a16:creationId xmlns:a16="http://schemas.microsoft.com/office/drawing/2014/main" id="{F76CCBD9-05A5-E8C8-6A4C-C9900FF1C282}"/>
-              </a:ext>
-            </a:extLst>
-          </p:cNvPr>
-          <p:cNvSpPr/>
-          <p:nvPr/>
-        </p:nvSpPr>
-        <p:spPr>
-          <a:xfrm>
-            <a:off x="1738296" y="1926639"/>
-            <a:ext cx="527539" cy="422031"/>
-          </a:xfrm>
-          <a:prstGeom prst="roundRect">
-            <a:avLst/>
-          </a:prstGeom>
-          <a:solidFill>
-            <a:schemeClr val="accent4">
-              <a:lumMod val="75000"/>
-            </a:schemeClr>
-          </a:solidFill>
-          <a:ln w="25400">
-            <a:solidFill>
-              <a:schemeClr val="accent4">
-                <a:lumMod val="50000"/>
-              </a:schemeClr>
-            </a:solidFill>
-          </a:ln>
-        </p:spPr>
-        <p:style>
-          <a:lnRef idx="2">
-            <a:schemeClr val="accent1">
-              <a:shade val="50000"/>
-            </a:schemeClr>
-          </a:lnRef>
-          <a:fillRef idx="1">
-            <a:schemeClr val="accent1"/>
-          </a:fillRef>
-          <a:effectRef idx="0">
-            <a:schemeClr val="accent1"/>
-          </a:effectRef>
-          <a:fontRef idx="minor">
-            <a:schemeClr val="lt1"/>
-          </a:fontRef>
-        </p:style>
-        <p:txBody>
-          <a:bodyPr rtlCol="0" anchor="ctr"/>
-          <a:lstStyle/>
-          <a:p>
-            <a:pPr algn="ctr"/>
-            <a:endParaRPr lang="en-DE"/>
-          </a:p>
-        </p:txBody>
-      </p:sp>
-      <p:sp>
-        <p:nvSpPr>
-          <p:cNvPr id="12" name="TextBox 11">
-            <a:extLst>
-              <a:ext uri="{FF2B5EF4-FFF2-40B4-BE49-F238E27FC236}">
-                <a16:creationId xmlns:a16="http://schemas.microsoft.com/office/drawing/2014/main" id="{AA473022-17BA-F212-7777-35D36DD086C6}"/>
+          <p:cNvPr id="44" name="TextBox 43">
+            <a:extLst>
+              <a:ext uri="{FF2B5EF4-FFF2-40B4-BE49-F238E27FC236}">
+                <a16:creationId xmlns:a16="http://schemas.microsoft.com/office/drawing/2014/main" id="{8E448D2A-AAB4-7001-9BC7-594F0E0D5586}"/>
               </a:ext>
             </a:extLst>
           </p:cNvPr>
@@ -9634,8 +9723,8 @@
         </p:nvSpPr>
         <p:spPr>
           <a:xfrm>
-            <a:off x="5433981" y="2202450"/>
-            <a:ext cx="1757790" cy="369332"/>
+            <a:off x="6787678" y="2330012"/>
+            <a:ext cx="486031" cy="369332"/>
           </a:xfrm>
           <a:prstGeom prst="rect">
             <a:avLst/>
@@ -9643,15 +9732,15 @@
           <a:noFill/>
         </p:spPr>
         <p:txBody>
-          <a:bodyPr wrap="none" rtlCol="0">
+          <a:bodyPr wrap="square" rtlCol="0">
             <a:spAutoFit/>
           </a:bodyPr>
           <a:lstStyle/>
           <a:p>
             <a:pPr algn="ctr"/>
             <a:r>
-              <a:rPr lang="en-US" dirty="0" err="1"/>
-              <a:t>NamespaceState</a:t>
+              <a:rPr lang="en-US" dirty="0"/>
+              <a:t>n:1</a:t>
             </a:r>
             <a:endParaRPr lang="en-DE" dirty="0"/>
           </a:p>
@@ -9659,250 +9748,28 @@
       </p:sp>
       <p:sp>
         <p:nvSpPr>
-          <p:cNvPr id="13" name="Rectangle 12">
-            <a:extLst>
-              <a:ext uri="{FF2B5EF4-FFF2-40B4-BE49-F238E27FC236}">
-                <a16:creationId xmlns:a16="http://schemas.microsoft.com/office/drawing/2014/main" id="{1815E742-ADB2-4CAB-5E81-F4CBB2A0CBAB}"/>
-              </a:ext>
-            </a:extLst>
-          </p:cNvPr>
-          <p:cNvSpPr/>
-          <p:nvPr/>
-        </p:nvSpPr>
-        <p:spPr>
-          <a:xfrm>
-            <a:off x="7821827" y="2718002"/>
-            <a:ext cx="2075935" cy="710998"/>
+          <p:cNvPr id="45" name="TextBox 44">
+            <a:extLst>
+              <a:ext uri="{FF2B5EF4-FFF2-40B4-BE49-F238E27FC236}">
+                <a16:creationId xmlns:a16="http://schemas.microsoft.com/office/drawing/2014/main" id="{0A2AB463-204A-962B-948A-273B203EA606}"/>
+              </a:ext>
+            </a:extLst>
+          </p:cNvPr>
+          <p:cNvSpPr txBox="1"/>
+          <p:nvPr/>
+        </p:nvSpPr>
+        <p:spPr>
+          <a:xfrm>
+            <a:off x="3656772" y="2330012"/>
+            <a:ext cx="486031" cy="369332"/>
           </a:xfrm>
           <a:prstGeom prst="rect">
             <a:avLst/>
           </a:prstGeom>
           <a:noFill/>
-          <a:ln w="25400"/>
-        </p:spPr>
-        <p:style>
-          <a:lnRef idx="2">
-            <a:schemeClr val="accent1">
-              <a:shade val="50000"/>
-            </a:schemeClr>
-          </a:lnRef>
-          <a:fillRef idx="1">
-            <a:schemeClr val="accent1"/>
-          </a:fillRef>
-          <a:effectRef idx="0">
-            <a:schemeClr val="accent1"/>
-          </a:effectRef>
-          <a:fontRef idx="minor">
-            <a:schemeClr val="lt1"/>
-          </a:fontRef>
-        </p:style>
-        <p:txBody>
-          <a:bodyPr rtlCol="0" anchor="ctr"/>
-          <a:lstStyle/>
-          <a:p>
-            <a:pPr algn="ctr"/>
-            <a:endParaRPr lang="en-DE"/>
-          </a:p>
-        </p:txBody>
-      </p:sp>
-      <p:sp>
-        <p:nvSpPr>
-          <p:cNvPr id="17" name="Rectangle: Rounded Corners 16">
-            <a:extLst>
-              <a:ext uri="{FF2B5EF4-FFF2-40B4-BE49-F238E27FC236}">
-                <a16:creationId xmlns:a16="http://schemas.microsoft.com/office/drawing/2014/main" id="{950B2B76-78AD-5DE7-D561-D555910A6437}"/>
-              </a:ext>
-            </a:extLst>
-          </p:cNvPr>
-          <p:cNvSpPr/>
-          <p:nvPr/>
-        </p:nvSpPr>
-        <p:spPr>
-          <a:xfrm>
-            <a:off x="4894568" y="2292777"/>
-            <a:ext cx="527539" cy="422031"/>
-          </a:xfrm>
-          <a:prstGeom prst="roundRect">
-            <a:avLst/>
-          </a:prstGeom>
-          <a:solidFill>
-            <a:schemeClr val="accent4">
-              <a:lumMod val="75000"/>
-            </a:schemeClr>
-          </a:solidFill>
-          <a:ln w="25400">
-            <a:solidFill>
-              <a:schemeClr val="accent4">
-                <a:lumMod val="50000"/>
-              </a:schemeClr>
-            </a:solidFill>
-          </a:ln>
-        </p:spPr>
-        <p:style>
-          <a:lnRef idx="2">
-            <a:schemeClr val="accent1">
-              <a:shade val="50000"/>
-            </a:schemeClr>
-          </a:lnRef>
-          <a:fillRef idx="1">
-            <a:schemeClr val="accent1"/>
-          </a:fillRef>
-          <a:effectRef idx="0">
-            <a:schemeClr val="accent1"/>
-          </a:effectRef>
-          <a:fontRef idx="minor">
-            <a:schemeClr val="lt1"/>
-          </a:fontRef>
-        </p:style>
-        <p:txBody>
-          <a:bodyPr rtlCol="0" anchor="ctr"/>
-          <a:lstStyle/>
-          <a:p>
-            <a:pPr algn="ctr"/>
-            <a:endParaRPr lang="en-DE"/>
-          </a:p>
-        </p:txBody>
-      </p:sp>
-      <p:sp>
-        <p:nvSpPr>
-          <p:cNvPr id="18" name="Rectangle: Rounded Corners 17">
-            <a:extLst>
-              <a:ext uri="{FF2B5EF4-FFF2-40B4-BE49-F238E27FC236}">
-                <a16:creationId xmlns:a16="http://schemas.microsoft.com/office/drawing/2014/main" id="{DD54B1CD-E967-34E8-6155-CCDD09105621}"/>
-              </a:ext>
-            </a:extLst>
-          </p:cNvPr>
-          <p:cNvSpPr/>
-          <p:nvPr/>
-        </p:nvSpPr>
-        <p:spPr>
-          <a:xfrm>
-            <a:off x="5009898" y="4271647"/>
-            <a:ext cx="527539" cy="422031"/>
-          </a:xfrm>
-          <a:prstGeom prst="roundRect">
-            <a:avLst/>
-          </a:prstGeom>
-          <a:solidFill>
-            <a:schemeClr val="accent4">
-              <a:lumMod val="75000"/>
-            </a:schemeClr>
-          </a:solidFill>
-          <a:ln w="25400">
-            <a:solidFill>
-              <a:schemeClr val="accent4">
-                <a:lumMod val="50000"/>
-              </a:schemeClr>
-            </a:solidFill>
-          </a:ln>
-        </p:spPr>
-        <p:style>
-          <a:lnRef idx="2">
-            <a:schemeClr val="accent1">
-              <a:shade val="50000"/>
-            </a:schemeClr>
-          </a:lnRef>
-          <a:fillRef idx="1">
-            <a:schemeClr val="accent1"/>
-          </a:fillRef>
-          <a:effectRef idx="0">
-            <a:schemeClr val="accent1"/>
-          </a:effectRef>
-          <a:fontRef idx="minor">
-            <a:schemeClr val="lt1"/>
-          </a:fontRef>
-        </p:style>
-        <p:txBody>
-          <a:bodyPr rtlCol="0" anchor="ctr"/>
-          <a:lstStyle/>
-          <a:p>
-            <a:pPr algn="ctr"/>
-            <a:endParaRPr lang="en-DE"/>
-          </a:p>
-        </p:txBody>
-      </p:sp>
-      <p:sp>
-        <p:nvSpPr>
-          <p:cNvPr id="19" name="Rectangle: Rounded Corners 18">
-            <a:extLst>
-              <a:ext uri="{FF2B5EF4-FFF2-40B4-BE49-F238E27FC236}">
-                <a16:creationId xmlns:a16="http://schemas.microsoft.com/office/drawing/2014/main" id="{B04BF5FC-31F8-FDAE-8FC0-CCA50FC7AE61}"/>
-              </a:ext>
-            </a:extLst>
-          </p:cNvPr>
-          <p:cNvSpPr/>
-          <p:nvPr/>
-        </p:nvSpPr>
-        <p:spPr>
-          <a:xfrm>
-            <a:off x="8029066" y="2862485"/>
-            <a:ext cx="527539" cy="422031"/>
-          </a:xfrm>
-          <a:prstGeom prst="roundRect">
-            <a:avLst/>
-          </a:prstGeom>
-          <a:solidFill>
-            <a:schemeClr val="accent4">
-              <a:lumMod val="75000"/>
-            </a:schemeClr>
-          </a:solidFill>
-          <a:ln w="25400">
-            <a:solidFill>
-              <a:schemeClr val="accent4">
-                <a:lumMod val="50000"/>
-              </a:schemeClr>
-            </a:solidFill>
-          </a:ln>
-        </p:spPr>
-        <p:style>
-          <a:lnRef idx="2">
-            <a:schemeClr val="accent1">
-              <a:shade val="50000"/>
-            </a:schemeClr>
-          </a:lnRef>
-          <a:fillRef idx="1">
-            <a:schemeClr val="accent1"/>
-          </a:fillRef>
-          <a:effectRef idx="0">
-            <a:schemeClr val="accent1"/>
-          </a:effectRef>
-          <a:fontRef idx="minor">
-            <a:schemeClr val="lt1"/>
-          </a:fontRef>
-        </p:style>
-        <p:txBody>
-          <a:bodyPr rtlCol="0" anchor="ctr"/>
-          <a:lstStyle/>
-          <a:p>
-            <a:pPr algn="ctr"/>
-            <a:endParaRPr lang="en-DE"/>
-          </a:p>
-        </p:txBody>
-      </p:sp>
-      <p:sp>
-        <p:nvSpPr>
-          <p:cNvPr id="14" name="TextBox 13">
-            <a:extLst>
-              <a:ext uri="{FF2B5EF4-FFF2-40B4-BE49-F238E27FC236}">
-                <a16:creationId xmlns:a16="http://schemas.microsoft.com/office/drawing/2014/main" id="{A24561DB-6217-A700-2EE4-DDC76CFC80FF}"/>
-              </a:ext>
-            </a:extLst>
-          </p:cNvPr>
-          <p:cNvSpPr txBox="1"/>
-          <p:nvPr/>
-        </p:nvSpPr>
-        <p:spPr>
-          <a:xfrm>
-            <a:off x="66076" y="6360587"/>
-            <a:ext cx="8490529" cy="369332"/>
-          </a:xfrm>
-          <a:prstGeom prst="rect">
-            <a:avLst/>
-          </a:prstGeom>
-          <a:noFill/>
-        </p:spPr>
-        <p:txBody>
-          <a:bodyPr wrap="none" rtlCol="0">
+        </p:spPr>
+        <p:txBody>
+          <a:bodyPr wrap="square" rtlCol="0">
             <a:spAutoFit/>
           </a:bodyPr>
           <a:lstStyle/>
@@ -9910,7 +9777,7 @@
             <a:pPr algn="ctr"/>
             <a:r>
               <a:rPr lang="en-US" dirty="0"/>
-              <a:t>Dynamic namespace assignment to controller instances (horizontal scaling) by first touch</a:t>
+              <a:t>n:1</a:t>
             </a:r>
             <a:endParaRPr lang="en-DE" dirty="0"/>
           </a:p>
@@ -9919,7 +9786,7 @@
     </p:spTree>
     <p:extLst>
       <p:ext uri="{BB962C8B-B14F-4D97-AF65-F5344CB8AC3E}">
-        <p14:creationId xmlns:p14="http://schemas.microsoft.com/office/powerpoint/2010/main" val="1194119223"/>
+        <p14:creationId xmlns:p14="http://schemas.microsoft.com/office/powerpoint/2010/main" val="3347917699"/>
       </p:ext>
     </p:extLst>
   </p:cSld>
@@ -9951,6 +9818,837 @@
           <p:cNvPr id="2" name="TextBox 1">
             <a:extLst>
               <a:ext uri="{FF2B5EF4-FFF2-40B4-BE49-F238E27FC236}">
+                <a16:creationId xmlns:a16="http://schemas.microsoft.com/office/drawing/2014/main" id="{C027B8CF-6ADE-9A6F-1748-657A658E3F55}"/>
+              </a:ext>
+            </a:extLst>
+          </p:cNvPr>
+          <p:cNvSpPr txBox="1"/>
+          <p:nvPr/>
+        </p:nvSpPr>
+        <p:spPr>
+          <a:xfrm>
+            <a:off x="79095" y="0"/>
+            <a:ext cx="2523448" cy="738664"/>
+          </a:xfrm>
+          <a:prstGeom prst="rect">
+            <a:avLst/>
+          </a:prstGeom>
+          <a:noFill/>
+        </p:spPr>
+        <p:txBody>
+          <a:bodyPr wrap="none" rtlCol="0">
+            <a:spAutoFit/>
+          </a:bodyPr>
+          <a:lstStyle/>
+          <a:p>
+            <a:r>
+              <a:rPr lang="en-US" sz="2400" dirty="0"/>
+              <a:t>Namespace Model</a:t>
+            </a:r>
+          </a:p>
+          <a:p>
+            <a:r>
+              <a:rPr lang="en-US" dirty="0"/>
+              <a:t>only local graphs</a:t>
+            </a:r>
+            <a:endParaRPr lang="en-DE" dirty="0"/>
+          </a:p>
+        </p:txBody>
+      </p:sp>
+      <p:sp>
+        <p:nvSpPr>
+          <p:cNvPr id="3" name="Rectangle 2">
+            <a:extLst>
+              <a:ext uri="{FF2B5EF4-FFF2-40B4-BE49-F238E27FC236}">
+                <a16:creationId xmlns:a16="http://schemas.microsoft.com/office/drawing/2014/main" id="{E91B7A0B-7D4F-424C-5329-C5450CF470F1}"/>
+              </a:ext>
+            </a:extLst>
+          </p:cNvPr>
+          <p:cNvSpPr/>
+          <p:nvPr/>
+        </p:nvSpPr>
+        <p:spPr>
+          <a:xfrm>
+            <a:off x="1582615" y="1746738"/>
+            <a:ext cx="9460523" cy="4267200"/>
+          </a:xfrm>
+          <a:prstGeom prst="rect">
+            <a:avLst/>
+          </a:prstGeom>
+          <a:noFill/>
+          <a:ln w="25400"/>
+        </p:spPr>
+        <p:style>
+          <a:lnRef idx="2">
+            <a:schemeClr val="accent1">
+              <a:shade val="50000"/>
+            </a:schemeClr>
+          </a:lnRef>
+          <a:fillRef idx="1">
+            <a:schemeClr val="accent1"/>
+          </a:fillRef>
+          <a:effectRef idx="0">
+            <a:schemeClr val="accent1"/>
+          </a:effectRef>
+          <a:fontRef idx="minor">
+            <a:schemeClr val="lt1"/>
+          </a:fontRef>
+        </p:style>
+        <p:txBody>
+          <a:bodyPr rtlCol="0" anchor="ctr"/>
+          <a:lstStyle/>
+          <a:p>
+            <a:pPr algn="ctr"/>
+            <a:endParaRPr lang="en-DE"/>
+          </a:p>
+        </p:txBody>
+      </p:sp>
+      <p:sp>
+        <p:nvSpPr>
+          <p:cNvPr id="4" name="Oval 3">
+            <a:extLst>
+              <a:ext uri="{FF2B5EF4-FFF2-40B4-BE49-F238E27FC236}">
+                <a16:creationId xmlns:a16="http://schemas.microsoft.com/office/drawing/2014/main" id="{22E12FB6-54CD-121B-C35C-DD54827539C2}"/>
+              </a:ext>
+            </a:extLst>
+          </p:cNvPr>
+          <p:cNvSpPr/>
+          <p:nvPr/>
+        </p:nvSpPr>
+        <p:spPr>
+          <a:xfrm>
+            <a:off x="2918968" y="2533336"/>
+            <a:ext cx="520700" cy="520700"/>
+          </a:xfrm>
+          <a:prstGeom prst="ellipse">
+            <a:avLst/>
+          </a:prstGeom>
+          <a:solidFill>
+            <a:schemeClr val="accent4"/>
+          </a:solidFill>
+          <a:ln w="25400">
+            <a:solidFill>
+              <a:schemeClr val="accent4">
+                <a:lumMod val="75000"/>
+              </a:schemeClr>
+            </a:solidFill>
+          </a:ln>
+        </p:spPr>
+        <p:style>
+          <a:lnRef idx="2">
+            <a:schemeClr val="accent1">
+              <a:shade val="50000"/>
+            </a:schemeClr>
+          </a:lnRef>
+          <a:fillRef idx="1">
+            <a:schemeClr val="accent1"/>
+          </a:fillRef>
+          <a:effectRef idx="0">
+            <a:schemeClr val="accent1"/>
+          </a:effectRef>
+          <a:fontRef idx="minor">
+            <a:schemeClr val="lt1"/>
+          </a:fontRef>
+        </p:style>
+        <p:txBody>
+          <a:bodyPr rtlCol="0" anchor="ctr"/>
+          <a:lstStyle/>
+          <a:p>
+            <a:pPr algn="ctr"/>
+            <a:endParaRPr lang="en-DE"/>
+          </a:p>
+        </p:txBody>
+      </p:sp>
+      <p:sp>
+        <p:nvSpPr>
+          <p:cNvPr id="5" name="Diamond 4">
+            <a:extLst>
+              <a:ext uri="{FF2B5EF4-FFF2-40B4-BE49-F238E27FC236}">
+                <a16:creationId xmlns:a16="http://schemas.microsoft.com/office/drawing/2014/main" id="{CD82E4D5-5F0A-A0F2-8BA1-5F647230BEAA}"/>
+              </a:ext>
+            </a:extLst>
+          </p:cNvPr>
+          <p:cNvSpPr/>
+          <p:nvPr/>
+        </p:nvSpPr>
+        <p:spPr>
+          <a:xfrm>
+            <a:off x="2314154" y="4358675"/>
+            <a:ext cx="576776" cy="576776"/>
+          </a:xfrm>
+          <a:prstGeom prst="diamond">
+            <a:avLst/>
+          </a:prstGeom>
+          <a:solidFill>
+            <a:schemeClr val="accent4"/>
+          </a:solidFill>
+          <a:ln w="25400">
+            <a:solidFill>
+              <a:schemeClr val="accent4">
+                <a:lumMod val="75000"/>
+              </a:schemeClr>
+            </a:solidFill>
+          </a:ln>
+        </p:spPr>
+        <p:style>
+          <a:lnRef idx="2">
+            <a:schemeClr val="accent1">
+              <a:shade val="50000"/>
+            </a:schemeClr>
+          </a:lnRef>
+          <a:fillRef idx="1">
+            <a:schemeClr val="accent1"/>
+          </a:fillRef>
+          <a:effectRef idx="0">
+            <a:schemeClr val="accent1"/>
+          </a:effectRef>
+          <a:fontRef idx="minor">
+            <a:schemeClr val="lt1"/>
+          </a:fontRef>
+        </p:style>
+        <p:txBody>
+          <a:bodyPr rtlCol="0" anchor="ctr"/>
+          <a:lstStyle/>
+          <a:p>
+            <a:pPr algn="ctr"/>
+            <a:endParaRPr lang="en-DE"/>
+          </a:p>
+        </p:txBody>
+      </p:sp>
+      <p:sp>
+        <p:nvSpPr>
+          <p:cNvPr id="6" name="Oval 5">
+            <a:extLst>
+              <a:ext uri="{FF2B5EF4-FFF2-40B4-BE49-F238E27FC236}">
+                <a16:creationId xmlns:a16="http://schemas.microsoft.com/office/drawing/2014/main" id="{8092B1EC-1F00-356C-93F7-7E4A320E2B52}"/>
+              </a:ext>
+            </a:extLst>
+          </p:cNvPr>
+          <p:cNvSpPr/>
+          <p:nvPr/>
+        </p:nvSpPr>
+        <p:spPr>
+          <a:xfrm>
+            <a:off x="3094814" y="3543615"/>
+            <a:ext cx="520700" cy="520700"/>
+          </a:xfrm>
+          <a:prstGeom prst="ellipse">
+            <a:avLst/>
+          </a:prstGeom>
+          <a:solidFill>
+            <a:schemeClr val="accent4"/>
+          </a:solidFill>
+          <a:ln w="25400">
+            <a:solidFill>
+              <a:schemeClr val="accent4">
+                <a:lumMod val="75000"/>
+              </a:schemeClr>
+            </a:solidFill>
+          </a:ln>
+        </p:spPr>
+        <p:style>
+          <a:lnRef idx="2">
+            <a:schemeClr val="accent1">
+              <a:shade val="50000"/>
+            </a:schemeClr>
+          </a:lnRef>
+          <a:fillRef idx="1">
+            <a:schemeClr val="accent1"/>
+          </a:fillRef>
+          <a:effectRef idx="0">
+            <a:schemeClr val="accent1"/>
+          </a:effectRef>
+          <a:fontRef idx="minor">
+            <a:schemeClr val="lt1"/>
+          </a:fontRef>
+        </p:style>
+        <p:txBody>
+          <a:bodyPr rtlCol="0" anchor="ctr"/>
+          <a:lstStyle/>
+          <a:p>
+            <a:pPr algn="ctr"/>
+            <a:endParaRPr lang="en-DE"/>
+          </a:p>
+        </p:txBody>
+      </p:sp>
+      <p:sp>
+        <p:nvSpPr>
+          <p:cNvPr id="7" name="Diamond 6">
+            <a:extLst>
+              <a:ext uri="{FF2B5EF4-FFF2-40B4-BE49-F238E27FC236}">
+                <a16:creationId xmlns:a16="http://schemas.microsoft.com/office/drawing/2014/main" id="{C619EA54-99F6-35B6-6A5B-BD134A10B46E}"/>
+              </a:ext>
+            </a:extLst>
+          </p:cNvPr>
+          <p:cNvSpPr/>
+          <p:nvPr/>
+        </p:nvSpPr>
+        <p:spPr>
+          <a:xfrm>
+            <a:off x="2185200" y="3107878"/>
+            <a:ext cx="576776" cy="576776"/>
+          </a:xfrm>
+          <a:prstGeom prst="diamond">
+            <a:avLst/>
+          </a:prstGeom>
+          <a:solidFill>
+            <a:schemeClr val="accent4"/>
+          </a:solidFill>
+          <a:ln w="25400">
+            <a:solidFill>
+              <a:schemeClr val="accent4">
+                <a:lumMod val="75000"/>
+              </a:schemeClr>
+            </a:solidFill>
+          </a:ln>
+        </p:spPr>
+        <p:style>
+          <a:lnRef idx="2">
+            <a:schemeClr val="accent1">
+              <a:shade val="50000"/>
+            </a:schemeClr>
+          </a:lnRef>
+          <a:fillRef idx="1">
+            <a:schemeClr val="accent1"/>
+          </a:fillRef>
+          <a:effectRef idx="0">
+            <a:schemeClr val="accent1"/>
+          </a:effectRef>
+          <a:fontRef idx="minor">
+            <a:schemeClr val="lt1"/>
+          </a:fontRef>
+        </p:style>
+        <p:txBody>
+          <a:bodyPr rtlCol="0" anchor="ctr"/>
+          <a:lstStyle/>
+          <a:p>
+            <a:pPr algn="ctr"/>
+            <a:endParaRPr lang="en-DE"/>
+          </a:p>
+        </p:txBody>
+      </p:sp>
+      <p:sp>
+        <p:nvSpPr>
+          <p:cNvPr id="8" name="Rectangle 7">
+            <a:extLst>
+              <a:ext uri="{FF2B5EF4-FFF2-40B4-BE49-F238E27FC236}">
+                <a16:creationId xmlns:a16="http://schemas.microsoft.com/office/drawing/2014/main" id="{43EB8EBF-CA85-0116-9091-BA57C6BA10BA}"/>
+              </a:ext>
+            </a:extLst>
+          </p:cNvPr>
+          <p:cNvSpPr/>
+          <p:nvPr/>
+        </p:nvSpPr>
+        <p:spPr>
+          <a:xfrm>
+            <a:off x="4776021" y="2093387"/>
+            <a:ext cx="5545015" cy="1661085"/>
+          </a:xfrm>
+          <a:prstGeom prst="rect">
+            <a:avLst/>
+          </a:prstGeom>
+          <a:noFill/>
+          <a:ln w="25400"/>
+        </p:spPr>
+        <p:style>
+          <a:lnRef idx="2">
+            <a:schemeClr val="accent1">
+              <a:shade val="50000"/>
+            </a:schemeClr>
+          </a:lnRef>
+          <a:fillRef idx="1">
+            <a:schemeClr val="accent1"/>
+          </a:fillRef>
+          <a:effectRef idx="0">
+            <a:schemeClr val="accent1"/>
+          </a:effectRef>
+          <a:fontRef idx="minor">
+            <a:schemeClr val="lt1"/>
+          </a:fontRef>
+        </p:style>
+        <p:txBody>
+          <a:bodyPr rtlCol="0" anchor="ctr"/>
+          <a:lstStyle/>
+          <a:p>
+            <a:pPr algn="ctr"/>
+            <a:endParaRPr lang="en-DE"/>
+          </a:p>
+        </p:txBody>
+      </p:sp>
+      <p:sp>
+        <p:nvSpPr>
+          <p:cNvPr id="9" name="Rectangle 8">
+            <a:extLst>
+              <a:ext uri="{FF2B5EF4-FFF2-40B4-BE49-F238E27FC236}">
+                <a16:creationId xmlns:a16="http://schemas.microsoft.com/office/drawing/2014/main" id="{8635AD2D-84BA-C541-EDA9-859F03E96DC4}"/>
+              </a:ext>
+            </a:extLst>
+          </p:cNvPr>
+          <p:cNvSpPr/>
+          <p:nvPr/>
+        </p:nvSpPr>
+        <p:spPr>
+          <a:xfrm>
+            <a:off x="4794759" y="4104908"/>
+            <a:ext cx="5545015" cy="1661085"/>
+          </a:xfrm>
+          <a:prstGeom prst="rect">
+            <a:avLst/>
+          </a:prstGeom>
+          <a:noFill/>
+          <a:ln w="25400"/>
+        </p:spPr>
+        <p:style>
+          <a:lnRef idx="2">
+            <a:schemeClr val="accent1">
+              <a:shade val="50000"/>
+            </a:schemeClr>
+          </a:lnRef>
+          <a:fillRef idx="1">
+            <a:schemeClr val="accent1"/>
+          </a:fillRef>
+          <a:effectRef idx="0">
+            <a:schemeClr val="accent1"/>
+          </a:effectRef>
+          <a:fontRef idx="minor">
+            <a:schemeClr val="lt1"/>
+          </a:fontRef>
+        </p:style>
+        <p:txBody>
+          <a:bodyPr rtlCol="0" anchor="ctr"/>
+          <a:lstStyle/>
+          <a:p>
+            <a:pPr algn="ctr"/>
+            <a:endParaRPr lang="en-DE"/>
+          </a:p>
+        </p:txBody>
+      </p:sp>
+      <p:sp>
+        <p:nvSpPr>
+          <p:cNvPr id="10" name="TextBox 9">
+            <a:extLst>
+              <a:ext uri="{FF2B5EF4-FFF2-40B4-BE49-F238E27FC236}">
+                <a16:creationId xmlns:a16="http://schemas.microsoft.com/office/drawing/2014/main" id="{BFB59EB4-6C25-71EA-9242-394017D041B8}"/>
+              </a:ext>
+            </a:extLst>
+          </p:cNvPr>
+          <p:cNvSpPr txBox="1"/>
+          <p:nvPr/>
+        </p:nvSpPr>
+        <p:spPr>
+          <a:xfrm>
+            <a:off x="3347166" y="1072717"/>
+            <a:ext cx="2895152" cy="369332"/>
+          </a:xfrm>
+          <a:prstGeom prst="rect">
+            <a:avLst/>
+          </a:prstGeom>
+          <a:noFill/>
+        </p:spPr>
+        <p:txBody>
+          <a:bodyPr wrap="none" rtlCol="0">
+            <a:spAutoFit/>
+          </a:bodyPr>
+          <a:lstStyle/>
+          <a:p>
+            <a:pPr algn="ctr"/>
+            <a:r>
+              <a:rPr lang="en-US" dirty="0"/>
+              <a:t>Hierarchical Identity   A/B/C</a:t>
+            </a:r>
+            <a:endParaRPr lang="en-DE" dirty="0"/>
+          </a:p>
+        </p:txBody>
+      </p:sp>
+      <p:sp>
+        <p:nvSpPr>
+          <p:cNvPr id="11" name="Rectangle: Rounded Corners 10">
+            <a:extLst>
+              <a:ext uri="{FF2B5EF4-FFF2-40B4-BE49-F238E27FC236}">
+                <a16:creationId xmlns:a16="http://schemas.microsoft.com/office/drawing/2014/main" id="{F76CCBD9-05A5-E8C8-6A4C-C9900FF1C282}"/>
+              </a:ext>
+            </a:extLst>
+          </p:cNvPr>
+          <p:cNvSpPr/>
+          <p:nvPr/>
+        </p:nvSpPr>
+        <p:spPr>
+          <a:xfrm>
+            <a:off x="1738296" y="1926639"/>
+            <a:ext cx="527539" cy="422031"/>
+          </a:xfrm>
+          <a:prstGeom prst="roundRect">
+            <a:avLst/>
+          </a:prstGeom>
+          <a:solidFill>
+            <a:schemeClr val="accent4">
+              <a:lumMod val="75000"/>
+            </a:schemeClr>
+          </a:solidFill>
+          <a:ln w="25400">
+            <a:solidFill>
+              <a:schemeClr val="accent4">
+                <a:lumMod val="50000"/>
+              </a:schemeClr>
+            </a:solidFill>
+          </a:ln>
+        </p:spPr>
+        <p:style>
+          <a:lnRef idx="2">
+            <a:schemeClr val="accent1">
+              <a:shade val="50000"/>
+            </a:schemeClr>
+          </a:lnRef>
+          <a:fillRef idx="1">
+            <a:schemeClr val="accent1"/>
+          </a:fillRef>
+          <a:effectRef idx="0">
+            <a:schemeClr val="accent1"/>
+          </a:effectRef>
+          <a:fontRef idx="minor">
+            <a:schemeClr val="lt1"/>
+          </a:fontRef>
+        </p:style>
+        <p:txBody>
+          <a:bodyPr rtlCol="0" anchor="ctr"/>
+          <a:lstStyle/>
+          <a:p>
+            <a:pPr algn="ctr"/>
+            <a:endParaRPr lang="en-DE"/>
+          </a:p>
+        </p:txBody>
+      </p:sp>
+      <p:sp>
+        <p:nvSpPr>
+          <p:cNvPr id="12" name="TextBox 11">
+            <a:extLst>
+              <a:ext uri="{FF2B5EF4-FFF2-40B4-BE49-F238E27FC236}">
+                <a16:creationId xmlns:a16="http://schemas.microsoft.com/office/drawing/2014/main" id="{AA473022-17BA-F212-7777-35D36DD086C6}"/>
+              </a:ext>
+            </a:extLst>
+          </p:cNvPr>
+          <p:cNvSpPr txBox="1"/>
+          <p:nvPr/>
+        </p:nvSpPr>
+        <p:spPr>
+          <a:xfrm>
+            <a:off x="5433981" y="2202450"/>
+            <a:ext cx="1757790" cy="369332"/>
+          </a:xfrm>
+          <a:prstGeom prst="rect">
+            <a:avLst/>
+          </a:prstGeom>
+          <a:noFill/>
+        </p:spPr>
+        <p:txBody>
+          <a:bodyPr wrap="none" rtlCol="0">
+            <a:spAutoFit/>
+          </a:bodyPr>
+          <a:lstStyle/>
+          <a:p>
+            <a:pPr algn="ctr"/>
+            <a:r>
+              <a:rPr lang="en-US" dirty="0" err="1"/>
+              <a:t>NamespaceState</a:t>
+            </a:r>
+            <a:endParaRPr lang="en-DE" dirty="0"/>
+          </a:p>
+        </p:txBody>
+      </p:sp>
+      <p:sp>
+        <p:nvSpPr>
+          <p:cNvPr id="13" name="Rectangle 12">
+            <a:extLst>
+              <a:ext uri="{FF2B5EF4-FFF2-40B4-BE49-F238E27FC236}">
+                <a16:creationId xmlns:a16="http://schemas.microsoft.com/office/drawing/2014/main" id="{1815E742-ADB2-4CAB-5E81-F4CBB2A0CBAB}"/>
+              </a:ext>
+            </a:extLst>
+          </p:cNvPr>
+          <p:cNvSpPr/>
+          <p:nvPr/>
+        </p:nvSpPr>
+        <p:spPr>
+          <a:xfrm>
+            <a:off x="7821827" y="2718002"/>
+            <a:ext cx="2075935" cy="710998"/>
+          </a:xfrm>
+          <a:prstGeom prst="rect">
+            <a:avLst/>
+          </a:prstGeom>
+          <a:noFill/>
+          <a:ln w="25400"/>
+        </p:spPr>
+        <p:style>
+          <a:lnRef idx="2">
+            <a:schemeClr val="accent1">
+              <a:shade val="50000"/>
+            </a:schemeClr>
+          </a:lnRef>
+          <a:fillRef idx="1">
+            <a:schemeClr val="accent1"/>
+          </a:fillRef>
+          <a:effectRef idx="0">
+            <a:schemeClr val="accent1"/>
+          </a:effectRef>
+          <a:fontRef idx="minor">
+            <a:schemeClr val="lt1"/>
+          </a:fontRef>
+        </p:style>
+        <p:txBody>
+          <a:bodyPr rtlCol="0" anchor="ctr"/>
+          <a:lstStyle/>
+          <a:p>
+            <a:pPr algn="ctr"/>
+            <a:endParaRPr lang="en-DE"/>
+          </a:p>
+        </p:txBody>
+      </p:sp>
+      <p:sp>
+        <p:nvSpPr>
+          <p:cNvPr id="17" name="Rectangle: Rounded Corners 16">
+            <a:extLst>
+              <a:ext uri="{FF2B5EF4-FFF2-40B4-BE49-F238E27FC236}">
+                <a16:creationId xmlns:a16="http://schemas.microsoft.com/office/drawing/2014/main" id="{950B2B76-78AD-5DE7-D561-D555910A6437}"/>
+              </a:ext>
+            </a:extLst>
+          </p:cNvPr>
+          <p:cNvSpPr/>
+          <p:nvPr/>
+        </p:nvSpPr>
+        <p:spPr>
+          <a:xfrm>
+            <a:off x="4894568" y="2292777"/>
+            <a:ext cx="527539" cy="422031"/>
+          </a:xfrm>
+          <a:prstGeom prst="roundRect">
+            <a:avLst/>
+          </a:prstGeom>
+          <a:solidFill>
+            <a:schemeClr val="accent4">
+              <a:lumMod val="75000"/>
+            </a:schemeClr>
+          </a:solidFill>
+          <a:ln w="25400">
+            <a:solidFill>
+              <a:schemeClr val="accent4">
+                <a:lumMod val="50000"/>
+              </a:schemeClr>
+            </a:solidFill>
+          </a:ln>
+        </p:spPr>
+        <p:style>
+          <a:lnRef idx="2">
+            <a:schemeClr val="accent1">
+              <a:shade val="50000"/>
+            </a:schemeClr>
+          </a:lnRef>
+          <a:fillRef idx="1">
+            <a:schemeClr val="accent1"/>
+          </a:fillRef>
+          <a:effectRef idx="0">
+            <a:schemeClr val="accent1"/>
+          </a:effectRef>
+          <a:fontRef idx="minor">
+            <a:schemeClr val="lt1"/>
+          </a:fontRef>
+        </p:style>
+        <p:txBody>
+          <a:bodyPr rtlCol="0" anchor="ctr"/>
+          <a:lstStyle/>
+          <a:p>
+            <a:pPr algn="ctr"/>
+            <a:endParaRPr lang="en-DE"/>
+          </a:p>
+        </p:txBody>
+      </p:sp>
+      <p:sp>
+        <p:nvSpPr>
+          <p:cNvPr id="18" name="Rectangle: Rounded Corners 17">
+            <a:extLst>
+              <a:ext uri="{FF2B5EF4-FFF2-40B4-BE49-F238E27FC236}">
+                <a16:creationId xmlns:a16="http://schemas.microsoft.com/office/drawing/2014/main" id="{DD54B1CD-E967-34E8-6155-CCDD09105621}"/>
+              </a:ext>
+            </a:extLst>
+          </p:cNvPr>
+          <p:cNvSpPr/>
+          <p:nvPr/>
+        </p:nvSpPr>
+        <p:spPr>
+          <a:xfrm>
+            <a:off x="5009898" y="4271647"/>
+            <a:ext cx="527539" cy="422031"/>
+          </a:xfrm>
+          <a:prstGeom prst="roundRect">
+            <a:avLst/>
+          </a:prstGeom>
+          <a:solidFill>
+            <a:schemeClr val="accent4">
+              <a:lumMod val="75000"/>
+            </a:schemeClr>
+          </a:solidFill>
+          <a:ln w="25400">
+            <a:solidFill>
+              <a:schemeClr val="accent4">
+                <a:lumMod val="50000"/>
+              </a:schemeClr>
+            </a:solidFill>
+          </a:ln>
+        </p:spPr>
+        <p:style>
+          <a:lnRef idx="2">
+            <a:schemeClr val="accent1">
+              <a:shade val="50000"/>
+            </a:schemeClr>
+          </a:lnRef>
+          <a:fillRef idx="1">
+            <a:schemeClr val="accent1"/>
+          </a:fillRef>
+          <a:effectRef idx="0">
+            <a:schemeClr val="accent1"/>
+          </a:effectRef>
+          <a:fontRef idx="minor">
+            <a:schemeClr val="lt1"/>
+          </a:fontRef>
+        </p:style>
+        <p:txBody>
+          <a:bodyPr rtlCol="0" anchor="ctr"/>
+          <a:lstStyle/>
+          <a:p>
+            <a:pPr algn="ctr"/>
+            <a:endParaRPr lang="en-DE"/>
+          </a:p>
+        </p:txBody>
+      </p:sp>
+      <p:sp>
+        <p:nvSpPr>
+          <p:cNvPr id="19" name="Rectangle: Rounded Corners 18">
+            <a:extLst>
+              <a:ext uri="{FF2B5EF4-FFF2-40B4-BE49-F238E27FC236}">
+                <a16:creationId xmlns:a16="http://schemas.microsoft.com/office/drawing/2014/main" id="{B04BF5FC-31F8-FDAE-8FC0-CCA50FC7AE61}"/>
+              </a:ext>
+            </a:extLst>
+          </p:cNvPr>
+          <p:cNvSpPr/>
+          <p:nvPr/>
+        </p:nvSpPr>
+        <p:spPr>
+          <a:xfrm>
+            <a:off x="8029066" y="2862485"/>
+            <a:ext cx="527539" cy="422031"/>
+          </a:xfrm>
+          <a:prstGeom prst="roundRect">
+            <a:avLst/>
+          </a:prstGeom>
+          <a:solidFill>
+            <a:schemeClr val="accent4">
+              <a:lumMod val="75000"/>
+            </a:schemeClr>
+          </a:solidFill>
+          <a:ln w="25400">
+            <a:solidFill>
+              <a:schemeClr val="accent4">
+                <a:lumMod val="50000"/>
+              </a:schemeClr>
+            </a:solidFill>
+          </a:ln>
+        </p:spPr>
+        <p:style>
+          <a:lnRef idx="2">
+            <a:schemeClr val="accent1">
+              <a:shade val="50000"/>
+            </a:schemeClr>
+          </a:lnRef>
+          <a:fillRef idx="1">
+            <a:schemeClr val="accent1"/>
+          </a:fillRef>
+          <a:effectRef idx="0">
+            <a:schemeClr val="accent1"/>
+          </a:effectRef>
+          <a:fontRef idx="minor">
+            <a:schemeClr val="lt1"/>
+          </a:fontRef>
+        </p:style>
+        <p:txBody>
+          <a:bodyPr rtlCol="0" anchor="ctr"/>
+          <a:lstStyle/>
+          <a:p>
+            <a:pPr algn="ctr"/>
+            <a:endParaRPr lang="en-DE"/>
+          </a:p>
+        </p:txBody>
+      </p:sp>
+      <p:sp>
+        <p:nvSpPr>
+          <p:cNvPr id="14" name="TextBox 13">
+            <a:extLst>
+              <a:ext uri="{FF2B5EF4-FFF2-40B4-BE49-F238E27FC236}">
+                <a16:creationId xmlns:a16="http://schemas.microsoft.com/office/drawing/2014/main" id="{A24561DB-6217-A700-2EE4-DDC76CFC80FF}"/>
+              </a:ext>
+            </a:extLst>
+          </p:cNvPr>
+          <p:cNvSpPr txBox="1"/>
+          <p:nvPr/>
+        </p:nvSpPr>
+        <p:spPr>
+          <a:xfrm>
+            <a:off x="66076" y="6360587"/>
+            <a:ext cx="8490529" cy="369332"/>
+          </a:xfrm>
+          <a:prstGeom prst="rect">
+            <a:avLst/>
+          </a:prstGeom>
+          <a:noFill/>
+        </p:spPr>
+        <p:txBody>
+          <a:bodyPr wrap="none" rtlCol="0">
+            <a:spAutoFit/>
+          </a:bodyPr>
+          <a:lstStyle/>
+          <a:p>
+            <a:pPr algn="ctr"/>
+            <a:r>
+              <a:rPr lang="en-US" dirty="0"/>
+              <a:t>Dynamic namespace assignment to controller instances (horizontal scaling) by first touch</a:t>
+            </a:r>
+            <a:endParaRPr lang="en-DE" dirty="0"/>
+          </a:p>
+        </p:txBody>
+      </p:sp>
+    </p:spTree>
+    <p:extLst>
+      <p:ext uri="{BB962C8B-B14F-4D97-AF65-F5344CB8AC3E}">
+        <p14:creationId xmlns:p14="http://schemas.microsoft.com/office/powerpoint/2010/main" val="1194119223"/>
+      </p:ext>
+    </p:extLst>
+  </p:cSld>
+  <p:clrMapOvr>
+    <a:masterClrMapping/>
+  </p:clrMapOvr>
+</p:sld>
+</file>
+
+<file path=ppt/slides/slide6.xml><?xml version="1.0" encoding="utf-8"?>
+<p:sld xmlns:a="http://schemas.openxmlformats.org/drawingml/2006/main" xmlns:r="http://schemas.openxmlformats.org/officeDocument/2006/relationships" xmlns:p="http://schemas.openxmlformats.org/presentationml/2006/main">
+  <p:cSld>
+    <p:spTree>
+      <p:nvGrpSpPr>
+        <p:cNvPr id="1" name=""/>
+        <p:cNvGrpSpPr/>
+        <p:nvPr/>
+      </p:nvGrpSpPr>
+      <p:grpSpPr>
+        <a:xfrm>
+          <a:off x="0" y="0"/>
+          <a:ext cx="0" cy="0"/>
+          <a:chOff x="0" y="0"/>
+          <a:chExt cx="0" cy="0"/>
+        </a:xfrm>
+      </p:grpSpPr>
+      <p:sp>
+        <p:nvSpPr>
+          <p:cNvPr id="2" name="TextBox 1">
+            <a:extLst>
+              <a:ext uri="{FF2B5EF4-FFF2-40B4-BE49-F238E27FC236}">
                 <a16:creationId xmlns:a16="http://schemas.microsoft.com/office/drawing/2014/main" id="{DB6DD97C-6782-FA54-839A-F9D8C549D48F}"/>
               </a:ext>
             </a:extLst>
@@ -10736,6 +11434,2099 @@
     <p:extLst>
       <p:ext uri="{BB962C8B-B14F-4D97-AF65-F5344CB8AC3E}">
         <p14:creationId xmlns:p14="http://schemas.microsoft.com/office/powerpoint/2010/main" val="3336942568"/>
+      </p:ext>
+    </p:extLst>
+  </p:cSld>
+  <p:clrMapOvr>
+    <a:masterClrMapping/>
+  </p:clrMapOvr>
+</p:sld>
+</file>
+
+<file path=ppt/slides/slide7.xml><?xml version="1.0" encoding="utf-8"?>
+<p:sld xmlns:a="http://schemas.openxmlformats.org/drawingml/2006/main" xmlns:r="http://schemas.openxmlformats.org/officeDocument/2006/relationships" xmlns:p="http://schemas.openxmlformats.org/presentationml/2006/main">
+  <p:cSld>
+    <p:spTree>
+      <p:nvGrpSpPr>
+        <p:cNvPr id="1" name=""/>
+        <p:cNvGrpSpPr/>
+        <p:nvPr/>
+      </p:nvGrpSpPr>
+      <p:grpSpPr>
+        <a:xfrm>
+          <a:off x="0" y="0"/>
+          <a:ext cx="0" cy="0"/>
+          <a:chOff x="0" y="0"/>
+          <a:chExt cx="0" cy="0"/>
+        </a:xfrm>
+      </p:grpSpPr>
+      <p:sp>
+        <p:nvSpPr>
+          <p:cNvPr id="2" name="TextBox 1">
+            <a:extLst>
+              <a:ext uri="{FF2B5EF4-FFF2-40B4-BE49-F238E27FC236}">
+                <a16:creationId xmlns:a16="http://schemas.microsoft.com/office/drawing/2014/main" id="{3ABB1A3C-8F10-AB3D-84C1-0758CF888131}"/>
+              </a:ext>
+            </a:extLst>
+          </p:cNvPr>
+          <p:cNvSpPr txBox="1"/>
+          <p:nvPr/>
+        </p:nvSpPr>
+        <p:spPr>
+          <a:xfrm>
+            <a:off x="-107384" y="0"/>
+            <a:ext cx="2458686" cy="461665"/>
+          </a:xfrm>
+          <a:prstGeom prst="rect">
+            <a:avLst/>
+          </a:prstGeom>
+          <a:noFill/>
+        </p:spPr>
+        <p:txBody>
+          <a:bodyPr wrap="none" rtlCol="0">
+            <a:spAutoFit/>
+          </a:bodyPr>
+          <a:lstStyle/>
+          <a:p>
+            <a:r>
+              <a:rPr lang="en-US" sz="2400" dirty="0"/>
+              <a:t>Demo Metamodel</a:t>
+            </a:r>
+            <a:endParaRPr lang="en-DE" sz="2400" dirty="0"/>
+          </a:p>
+        </p:txBody>
+      </p:sp>
+      <p:grpSp>
+        <p:nvGrpSpPr>
+          <p:cNvPr id="3" name="Group 2">
+            <a:extLst>
+              <a:ext uri="{FF2B5EF4-FFF2-40B4-BE49-F238E27FC236}">
+                <a16:creationId xmlns:a16="http://schemas.microsoft.com/office/drawing/2014/main" id="{99E5AB45-C4A3-D2FB-8F3A-62E29D0B39DD}"/>
+              </a:ext>
+            </a:extLst>
+          </p:cNvPr>
+          <p:cNvGrpSpPr/>
+          <p:nvPr/>
+        </p:nvGrpSpPr>
+        <p:grpSpPr>
+          <a:xfrm>
+            <a:off x="8144704" y="1574880"/>
+            <a:ext cx="1272746" cy="667265"/>
+            <a:chOff x="7451124" y="1272746"/>
+            <a:chExt cx="1272746" cy="667265"/>
+          </a:xfrm>
+        </p:grpSpPr>
+        <p:sp>
+          <p:nvSpPr>
+            <p:cNvPr id="4" name="Rectangle: Rounded Corners 3">
+              <a:extLst>
+                <a:ext uri="{FF2B5EF4-FFF2-40B4-BE49-F238E27FC236}">
+                  <a16:creationId xmlns:a16="http://schemas.microsoft.com/office/drawing/2014/main" id="{7E9B29E1-9921-8195-1266-82EB032FF52F}"/>
+                </a:ext>
+              </a:extLst>
+            </p:cNvPr>
+            <p:cNvSpPr/>
+            <p:nvPr/>
+          </p:nvSpPr>
+          <p:spPr>
+            <a:xfrm>
+              <a:off x="7451124" y="1272746"/>
+              <a:ext cx="1272746" cy="667265"/>
+            </a:xfrm>
+            <a:prstGeom prst="roundRect">
+              <a:avLst/>
+            </a:prstGeom>
+            <a:solidFill>
+              <a:schemeClr val="accent1">
+                <a:lumMod val="60000"/>
+                <a:lumOff val="40000"/>
+              </a:schemeClr>
+            </a:solidFill>
+            <a:ln w="25400">
+              <a:solidFill>
+                <a:schemeClr val="accent1">
+                  <a:lumMod val="75000"/>
+                </a:schemeClr>
+              </a:solidFill>
+              <a:prstDash val="sysDot"/>
+            </a:ln>
+          </p:spPr>
+          <p:style>
+            <a:lnRef idx="2">
+              <a:schemeClr val="accent1">
+                <a:shade val="50000"/>
+              </a:schemeClr>
+            </a:lnRef>
+            <a:fillRef idx="1">
+              <a:schemeClr val="accent1"/>
+            </a:fillRef>
+            <a:effectRef idx="0">
+              <a:schemeClr val="accent1"/>
+            </a:effectRef>
+            <a:fontRef idx="minor">
+              <a:schemeClr val="lt1"/>
+            </a:fontRef>
+          </p:style>
+          <p:txBody>
+            <a:bodyPr rtlCol="0" anchor="ctr"/>
+            <a:lstStyle/>
+            <a:p>
+              <a:pPr algn="ctr"/>
+              <a:endParaRPr lang="en-DE"/>
+            </a:p>
+          </p:txBody>
+        </p:sp>
+        <p:sp>
+          <p:nvSpPr>
+            <p:cNvPr id="5" name="TextBox 4">
+              <a:extLst>
+                <a:ext uri="{FF2B5EF4-FFF2-40B4-BE49-F238E27FC236}">
+                  <a16:creationId xmlns:a16="http://schemas.microsoft.com/office/drawing/2014/main" id="{CD04DC01-9F92-BD1E-D2C2-D8620E0DAA74}"/>
+                </a:ext>
+              </a:extLst>
+            </p:cNvPr>
+            <p:cNvSpPr txBox="1"/>
+            <p:nvPr/>
+          </p:nvSpPr>
+          <p:spPr>
+            <a:xfrm>
+              <a:off x="7501954" y="1421712"/>
+              <a:ext cx="1171090" cy="369332"/>
+            </a:xfrm>
+            <a:prstGeom prst="rect">
+              <a:avLst/>
+            </a:prstGeom>
+            <a:noFill/>
+          </p:spPr>
+          <p:txBody>
+            <a:bodyPr wrap="none" rtlCol="0">
+              <a:spAutoFit/>
+            </a:bodyPr>
+            <a:lstStyle/>
+            <a:p>
+              <a:pPr algn="ctr"/>
+              <a:r>
+                <a:rPr lang="en-US" dirty="0" err="1"/>
+                <a:t>NodeState</a:t>
+              </a:r>
+              <a:endParaRPr lang="en-DE" dirty="0"/>
+            </a:p>
+          </p:txBody>
+        </p:sp>
+      </p:grpSp>
+      <p:grpSp>
+        <p:nvGrpSpPr>
+          <p:cNvPr id="6" name="Group 5">
+            <a:extLst>
+              <a:ext uri="{FF2B5EF4-FFF2-40B4-BE49-F238E27FC236}">
+                <a16:creationId xmlns:a16="http://schemas.microsoft.com/office/drawing/2014/main" id="{406F4CCD-E9DC-5710-BD31-6E25BFE4D24A}"/>
+              </a:ext>
+            </a:extLst>
+          </p:cNvPr>
+          <p:cNvGrpSpPr/>
+          <p:nvPr/>
+        </p:nvGrpSpPr>
+        <p:grpSpPr>
+          <a:xfrm>
+            <a:off x="4664341" y="1550958"/>
+            <a:ext cx="1336431" cy="715108"/>
+            <a:chOff x="2872154" y="1817077"/>
+            <a:chExt cx="1336431" cy="715108"/>
+          </a:xfrm>
+        </p:grpSpPr>
+        <p:sp>
+          <p:nvSpPr>
+            <p:cNvPr id="7" name="Oval 6">
+              <a:extLst>
+                <a:ext uri="{FF2B5EF4-FFF2-40B4-BE49-F238E27FC236}">
+                  <a16:creationId xmlns:a16="http://schemas.microsoft.com/office/drawing/2014/main" id="{B73B9D5B-FE87-A4F5-A5F3-E81CE342F353}"/>
+                </a:ext>
+              </a:extLst>
+            </p:cNvPr>
+            <p:cNvSpPr/>
+            <p:nvPr/>
+          </p:nvSpPr>
+          <p:spPr>
+            <a:xfrm>
+              <a:off x="2872154" y="1817077"/>
+              <a:ext cx="1336431" cy="715108"/>
+            </a:xfrm>
+            <a:prstGeom prst="ellipse">
+              <a:avLst/>
+            </a:prstGeom>
+            <a:solidFill>
+              <a:schemeClr val="accent4"/>
+            </a:solidFill>
+            <a:ln w="25400">
+              <a:solidFill>
+                <a:schemeClr val="accent4">
+                  <a:lumMod val="50000"/>
+                </a:schemeClr>
+              </a:solidFill>
+              <a:prstDash val="sysDot"/>
+            </a:ln>
+          </p:spPr>
+          <p:style>
+            <a:lnRef idx="2">
+              <a:schemeClr val="accent1">
+                <a:shade val="50000"/>
+              </a:schemeClr>
+            </a:lnRef>
+            <a:fillRef idx="1">
+              <a:schemeClr val="accent1"/>
+            </a:fillRef>
+            <a:effectRef idx="0">
+              <a:schemeClr val="accent1"/>
+            </a:effectRef>
+            <a:fontRef idx="minor">
+              <a:schemeClr val="lt1"/>
+            </a:fontRef>
+          </p:style>
+          <p:txBody>
+            <a:bodyPr rtlCol="0" anchor="ctr"/>
+            <a:lstStyle/>
+            <a:p>
+              <a:pPr algn="ctr"/>
+              <a:endParaRPr lang="en-DE"/>
+            </a:p>
+          </p:txBody>
+        </p:sp>
+        <p:sp>
+          <p:nvSpPr>
+            <p:cNvPr id="8" name="TextBox 7">
+              <a:extLst>
+                <a:ext uri="{FF2B5EF4-FFF2-40B4-BE49-F238E27FC236}">
+                  <a16:creationId xmlns:a16="http://schemas.microsoft.com/office/drawing/2014/main" id="{867320A3-C671-052F-A524-8E45FC755996}"/>
+                </a:ext>
+              </a:extLst>
+            </p:cNvPr>
+            <p:cNvSpPr txBox="1"/>
+            <p:nvPr/>
+          </p:nvSpPr>
+          <p:spPr>
+            <a:xfrm>
+              <a:off x="3017887" y="1851466"/>
+              <a:ext cx="1044966" cy="646331"/>
+            </a:xfrm>
+            <a:prstGeom prst="rect">
+              <a:avLst/>
+            </a:prstGeom>
+            <a:noFill/>
+          </p:spPr>
+          <p:txBody>
+            <a:bodyPr wrap="none" rtlCol="0">
+              <a:spAutoFit/>
+            </a:bodyPr>
+            <a:lstStyle/>
+            <a:p>
+              <a:pPr algn="ctr"/>
+              <a:r>
+                <a:rPr lang="en-US" dirty="0"/>
+                <a:t>Updating</a:t>
+              </a:r>
+            </a:p>
+            <a:p>
+              <a:pPr algn="ctr"/>
+              <a:r>
+                <a:rPr lang="en-US" dirty="0"/>
+                <a:t>Phase</a:t>
+              </a:r>
+              <a:endParaRPr lang="en-DE" dirty="0"/>
+            </a:p>
+          </p:txBody>
+        </p:sp>
+      </p:grpSp>
+      <p:grpSp>
+        <p:nvGrpSpPr>
+          <p:cNvPr id="9" name="Group 8">
+            <a:extLst>
+              <a:ext uri="{FF2B5EF4-FFF2-40B4-BE49-F238E27FC236}">
+                <a16:creationId xmlns:a16="http://schemas.microsoft.com/office/drawing/2014/main" id="{7BF9F96F-EF73-8BA4-F9E1-254FA572D19F}"/>
+              </a:ext>
+            </a:extLst>
+          </p:cNvPr>
+          <p:cNvGrpSpPr/>
+          <p:nvPr/>
+        </p:nvGrpSpPr>
+        <p:grpSpPr>
+          <a:xfrm>
+            <a:off x="1380342" y="1574880"/>
+            <a:ext cx="1272746" cy="667265"/>
+            <a:chOff x="7451124" y="1272746"/>
+            <a:chExt cx="1272746" cy="667265"/>
+          </a:xfrm>
+        </p:grpSpPr>
+        <p:sp>
+          <p:nvSpPr>
+            <p:cNvPr id="10" name="Rectangle: Rounded Corners 9">
+              <a:extLst>
+                <a:ext uri="{FF2B5EF4-FFF2-40B4-BE49-F238E27FC236}">
+                  <a16:creationId xmlns:a16="http://schemas.microsoft.com/office/drawing/2014/main" id="{EDDDD10D-8314-92E0-83D1-28A93BC44EE7}"/>
+                </a:ext>
+              </a:extLst>
+            </p:cNvPr>
+            <p:cNvSpPr/>
+            <p:nvPr/>
+          </p:nvSpPr>
+          <p:spPr>
+            <a:xfrm>
+              <a:off x="7451124" y="1272746"/>
+              <a:ext cx="1272746" cy="667265"/>
+            </a:xfrm>
+            <a:prstGeom prst="roundRect">
+              <a:avLst/>
+            </a:prstGeom>
+            <a:solidFill>
+              <a:schemeClr val="accent1">
+                <a:lumMod val="40000"/>
+                <a:lumOff val="60000"/>
+              </a:schemeClr>
+            </a:solidFill>
+            <a:ln w="25400">
+              <a:solidFill>
+                <a:schemeClr val="accent1">
+                  <a:lumMod val="75000"/>
+                </a:schemeClr>
+              </a:solidFill>
+              <a:prstDash val="sysDot"/>
+            </a:ln>
+          </p:spPr>
+          <p:style>
+            <a:lnRef idx="2">
+              <a:schemeClr val="accent1">
+                <a:shade val="50000"/>
+              </a:schemeClr>
+            </a:lnRef>
+            <a:fillRef idx="1">
+              <a:schemeClr val="accent1"/>
+            </a:fillRef>
+            <a:effectRef idx="0">
+              <a:schemeClr val="accent1"/>
+            </a:effectRef>
+            <a:fontRef idx="minor">
+              <a:schemeClr val="lt1"/>
+            </a:fontRef>
+          </p:style>
+          <p:txBody>
+            <a:bodyPr rtlCol="0" anchor="ctr"/>
+            <a:lstStyle/>
+            <a:p>
+              <a:pPr algn="ctr"/>
+              <a:endParaRPr lang="en-DE"/>
+            </a:p>
+          </p:txBody>
+        </p:sp>
+        <p:sp>
+          <p:nvSpPr>
+            <p:cNvPr id="11" name="TextBox 10">
+              <a:extLst>
+                <a:ext uri="{FF2B5EF4-FFF2-40B4-BE49-F238E27FC236}">
+                  <a16:creationId xmlns:a16="http://schemas.microsoft.com/office/drawing/2014/main" id="{9D474666-652F-051C-A770-6819CA2372A3}"/>
+                </a:ext>
+              </a:extLst>
+            </p:cNvPr>
+            <p:cNvSpPr txBox="1"/>
+            <p:nvPr/>
+          </p:nvSpPr>
+          <p:spPr>
+            <a:xfrm>
+              <a:off x="7741087" y="1421712"/>
+              <a:ext cx="692818" cy="369332"/>
+            </a:xfrm>
+            <a:prstGeom prst="rect">
+              <a:avLst/>
+            </a:prstGeom>
+            <a:noFill/>
+          </p:spPr>
+          <p:txBody>
+            <a:bodyPr wrap="none" rtlCol="0">
+              <a:spAutoFit/>
+            </a:bodyPr>
+            <a:lstStyle/>
+            <a:p>
+              <a:pPr algn="ctr"/>
+              <a:r>
+                <a:rPr lang="en-US" dirty="0"/>
+                <a:t>Node</a:t>
+              </a:r>
+              <a:endParaRPr lang="en-DE" dirty="0"/>
+            </a:p>
+          </p:txBody>
+        </p:sp>
+      </p:grpSp>
+      <p:cxnSp>
+        <p:nvCxnSpPr>
+          <p:cNvPr id="12" name="Straight Arrow Connector 11">
+            <a:extLst>
+              <a:ext uri="{FF2B5EF4-FFF2-40B4-BE49-F238E27FC236}">
+                <a16:creationId xmlns:a16="http://schemas.microsoft.com/office/drawing/2014/main" id="{9C41ACEB-CF83-C5BD-9E3B-2208931E4881}"/>
+              </a:ext>
+            </a:extLst>
+          </p:cNvPr>
+          <p:cNvCxnSpPr>
+            <a:cxnSpLocks/>
+            <a:stCxn id="7" idx="6"/>
+            <a:endCxn id="4" idx="1"/>
+          </p:cNvCxnSpPr>
+          <p:nvPr/>
+        </p:nvCxnSpPr>
+        <p:spPr>
+          <a:xfrm>
+            <a:off x="6000772" y="1908512"/>
+            <a:ext cx="2143932" cy="1"/>
+          </a:xfrm>
+          <a:prstGeom prst="straightConnector1">
+            <a:avLst/>
+          </a:prstGeom>
+          <a:ln w="25400">
+            <a:solidFill>
+              <a:schemeClr val="accent1">
+                <a:lumMod val="75000"/>
+              </a:schemeClr>
+            </a:solidFill>
+            <a:tailEnd type="stealth" w="lg" len="lg"/>
+          </a:ln>
+        </p:spPr>
+        <p:style>
+          <a:lnRef idx="1">
+            <a:schemeClr val="accent1"/>
+          </a:lnRef>
+          <a:fillRef idx="0">
+            <a:schemeClr val="accent1"/>
+          </a:fillRef>
+          <a:effectRef idx="0">
+            <a:schemeClr val="accent1"/>
+          </a:effectRef>
+          <a:fontRef idx="minor">
+            <a:schemeClr val="tx1"/>
+          </a:fontRef>
+        </p:style>
+      </p:cxnSp>
+      <p:sp>
+        <p:nvSpPr>
+          <p:cNvPr id="18" name="Arc 17">
+            <a:extLst>
+              <a:ext uri="{FF2B5EF4-FFF2-40B4-BE49-F238E27FC236}">
+                <a16:creationId xmlns:a16="http://schemas.microsoft.com/office/drawing/2014/main" id="{E144152D-D371-6FFD-189B-81AFB97B10AE}"/>
+              </a:ext>
+            </a:extLst>
+          </p:cNvPr>
+          <p:cNvSpPr/>
+          <p:nvPr/>
+        </p:nvSpPr>
+        <p:spPr>
+          <a:xfrm>
+            <a:off x="5100739" y="1225897"/>
+            <a:ext cx="527926" cy="718900"/>
+          </a:xfrm>
+          <a:prstGeom prst="arc">
+            <a:avLst>
+              <a:gd name="adj1" fmla="val 10894774"/>
+              <a:gd name="adj2" fmla="val 0"/>
+            </a:avLst>
+          </a:prstGeom>
+          <a:ln w="25400">
+            <a:solidFill>
+              <a:schemeClr val="accent4">
+                <a:lumMod val="75000"/>
+              </a:schemeClr>
+            </a:solidFill>
+            <a:tailEnd type="triangle" w="lg" len="lg"/>
+          </a:ln>
+        </p:spPr>
+        <p:style>
+          <a:lnRef idx="1">
+            <a:schemeClr val="accent1"/>
+          </a:lnRef>
+          <a:fillRef idx="0">
+            <a:schemeClr val="accent1"/>
+          </a:fillRef>
+          <a:effectRef idx="0">
+            <a:schemeClr val="accent1"/>
+          </a:effectRef>
+          <a:fontRef idx="minor">
+            <a:schemeClr val="tx1"/>
+          </a:fontRef>
+        </p:style>
+        <p:txBody>
+          <a:bodyPr rtlCol="0" anchor="ctr"/>
+          <a:lstStyle/>
+          <a:p>
+            <a:pPr algn="ctr"/>
+            <a:endParaRPr lang="en-DE"/>
+          </a:p>
+        </p:txBody>
+      </p:sp>
+      <p:cxnSp>
+        <p:nvCxnSpPr>
+          <p:cNvPr id="19" name="Straight Arrow Connector 18">
+            <a:extLst>
+              <a:ext uri="{FF2B5EF4-FFF2-40B4-BE49-F238E27FC236}">
+                <a16:creationId xmlns:a16="http://schemas.microsoft.com/office/drawing/2014/main" id="{82C3D094-A099-5A21-A771-618D0B7416F3}"/>
+              </a:ext>
+            </a:extLst>
+          </p:cNvPr>
+          <p:cNvCxnSpPr>
+            <a:cxnSpLocks/>
+            <a:stCxn id="10" idx="3"/>
+            <a:endCxn id="7" idx="2"/>
+          </p:cNvCxnSpPr>
+          <p:nvPr/>
+        </p:nvCxnSpPr>
+        <p:spPr>
+          <a:xfrm flipV="1">
+            <a:off x="2653088" y="1908512"/>
+            <a:ext cx="2011253" cy="1"/>
+          </a:xfrm>
+          <a:prstGeom prst="straightConnector1">
+            <a:avLst/>
+          </a:prstGeom>
+          <a:ln w="25400">
+            <a:solidFill>
+              <a:schemeClr val="accent1">
+                <a:lumMod val="40000"/>
+                <a:lumOff val="60000"/>
+              </a:schemeClr>
+            </a:solidFill>
+            <a:headEnd type="none"/>
+            <a:tailEnd type="arrow" w="lg" len="lg"/>
+          </a:ln>
+        </p:spPr>
+        <p:style>
+          <a:lnRef idx="1">
+            <a:schemeClr val="accent1"/>
+          </a:lnRef>
+          <a:fillRef idx="0">
+            <a:schemeClr val="accent1"/>
+          </a:fillRef>
+          <a:effectRef idx="0">
+            <a:schemeClr val="accent1"/>
+          </a:effectRef>
+          <a:fontRef idx="minor">
+            <a:schemeClr val="tx1"/>
+          </a:fontRef>
+        </p:style>
+      </p:cxnSp>
+      <p:sp>
+        <p:nvSpPr>
+          <p:cNvPr id="22" name="TextBox 21">
+            <a:extLst>
+              <a:ext uri="{FF2B5EF4-FFF2-40B4-BE49-F238E27FC236}">
+                <a16:creationId xmlns:a16="http://schemas.microsoft.com/office/drawing/2014/main" id="{7B475A88-0BDC-6C3C-F60A-A58450A7D645}"/>
+              </a:ext>
+            </a:extLst>
+          </p:cNvPr>
+          <p:cNvSpPr txBox="1"/>
+          <p:nvPr/>
+        </p:nvSpPr>
+        <p:spPr>
+          <a:xfrm>
+            <a:off x="1460819" y="610631"/>
+            <a:ext cx="788807" cy="369332"/>
+          </a:xfrm>
+          <a:prstGeom prst="rect">
+            <a:avLst/>
+          </a:prstGeom>
+          <a:noFill/>
+        </p:spPr>
+        <p:txBody>
+          <a:bodyPr wrap="none" rtlCol="0">
+            <a:spAutoFit/>
+          </a:bodyPr>
+          <a:lstStyle/>
+          <a:p>
+            <a:pPr algn="ctr"/>
+            <a:r>
+              <a:rPr lang="en-US" dirty="0"/>
+              <a:t>Extern</a:t>
+            </a:r>
+            <a:endParaRPr lang="en-DE" dirty="0"/>
+          </a:p>
+        </p:txBody>
+      </p:sp>
+      <p:sp>
+        <p:nvSpPr>
+          <p:cNvPr id="23" name="TextBox 22">
+            <a:extLst>
+              <a:ext uri="{FF2B5EF4-FFF2-40B4-BE49-F238E27FC236}">
+                <a16:creationId xmlns:a16="http://schemas.microsoft.com/office/drawing/2014/main" id="{066953F1-EF77-4F27-E30F-8C2B9A2D473F}"/>
+              </a:ext>
+            </a:extLst>
+          </p:cNvPr>
+          <p:cNvSpPr txBox="1"/>
+          <p:nvPr/>
+        </p:nvSpPr>
+        <p:spPr>
+          <a:xfrm>
+            <a:off x="8421795" y="610631"/>
+            <a:ext cx="753924" cy="369332"/>
+          </a:xfrm>
+          <a:prstGeom prst="rect">
+            <a:avLst/>
+          </a:prstGeom>
+          <a:noFill/>
+        </p:spPr>
+        <p:txBody>
+          <a:bodyPr wrap="none" rtlCol="0">
+            <a:spAutoFit/>
+          </a:bodyPr>
+          <a:lstStyle/>
+          <a:p>
+            <a:pPr algn="ctr"/>
+            <a:r>
+              <a:rPr lang="en-US" dirty="0"/>
+              <a:t>Intern</a:t>
+            </a:r>
+            <a:endParaRPr lang="en-DE" dirty="0"/>
+          </a:p>
+        </p:txBody>
+      </p:sp>
+      <p:sp>
+        <p:nvSpPr>
+          <p:cNvPr id="24" name="TextBox 23">
+            <a:extLst>
+              <a:ext uri="{FF2B5EF4-FFF2-40B4-BE49-F238E27FC236}">
+                <a16:creationId xmlns:a16="http://schemas.microsoft.com/office/drawing/2014/main" id="{BAED9584-AF2C-2AB4-B59B-C093007EC0E2}"/>
+              </a:ext>
+            </a:extLst>
+          </p:cNvPr>
+          <p:cNvSpPr txBox="1"/>
+          <p:nvPr/>
+        </p:nvSpPr>
+        <p:spPr>
+          <a:xfrm>
+            <a:off x="4241395" y="610631"/>
+            <a:ext cx="1698094" cy="369332"/>
+          </a:xfrm>
+          <a:prstGeom prst="rect">
+            <a:avLst/>
+          </a:prstGeom>
+          <a:noFill/>
+        </p:spPr>
+        <p:txBody>
+          <a:bodyPr wrap="none" rtlCol="0">
+            <a:spAutoFit/>
+          </a:bodyPr>
+          <a:lstStyle/>
+          <a:p>
+            <a:pPr algn="ctr"/>
+            <a:r>
+              <a:rPr lang="en-US" dirty="0"/>
+              <a:t>Phases of Intern</a:t>
+            </a:r>
+            <a:endParaRPr lang="en-DE" dirty="0"/>
+          </a:p>
+        </p:txBody>
+      </p:sp>
+      <p:sp>
+        <p:nvSpPr>
+          <p:cNvPr id="25" name="TextBox 24">
+            <a:extLst>
+              <a:ext uri="{FF2B5EF4-FFF2-40B4-BE49-F238E27FC236}">
+                <a16:creationId xmlns:a16="http://schemas.microsoft.com/office/drawing/2014/main" id="{E3903801-0012-FA81-B782-2546C30451E7}"/>
+              </a:ext>
+            </a:extLst>
+          </p:cNvPr>
+          <p:cNvSpPr txBox="1"/>
+          <p:nvPr/>
+        </p:nvSpPr>
+        <p:spPr>
+          <a:xfrm>
+            <a:off x="323994" y="2893695"/>
+            <a:ext cx="3316742" cy="461665"/>
+          </a:xfrm>
+          <a:prstGeom prst="rect">
+            <a:avLst/>
+          </a:prstGeom>
+          <a:noFill/>
+        </p:spPr>
+        <p:txBody>
+          <a:bodyPr wrap="none" rtlCol="0">
+            <a:spAutoFit/>
+          </a:bodyPr>
+          <a:lstStyle/>
+          <a:p>
+            <a:r>
+              <a:rPr lang="en-US" sz="2400" dirty="0"/>
+              <a:t>Concrete Model Example</a:t>
+            </a:r>
+            <a:endParaRPr lang="en-DE" sz="2400" dirty="0"/>
+          </a:p>
+        </p:txBody>
+      </p:sp>
+      <p:grpSp>
+        <p:nvGrpSpPr>
+          <p:cNvPr id="26" name="Group 25">
+            <a:extLst>
+              <a:ext uri="{FF2B5EF4-FFF2-40B4-BE49-F238E27FC236}">
+                <a16:creationId xmlns:a16="http://schemas.microsoft.com/office/drawing/2014/main" id="{131FD298-3FCE-BEF8-7E5C-32FF84EE188E}"/>
+              </a:ext>
+            </a:extLst>
+          </p:cNvPr>
+          <p:cNvGrpSpPr/>
+          <p:nvPr/>
+        </p:nvGrpSpPr>
+        <p:grpSpPr>
+          <a:xfrm>
+            <a:off x="8144704" y="3709562"/>
+            <a:ext cx="1357038" cy="667265"/>
+            <a:chOff x="7408981" y="1272746"/>
+            <a:chExt cx="1357038" cy="667265"/>
+          </a:xfrm>
+        </p:grpSpPr>
+        <p:sp>
+          <p:nvSpPr>
+            <p:cNvPr id="27" name="Rectangle: Rounded Corners 26">
+              <a:extLst>
+                <a:ext uri="{FF2B5EF4-FFF2-40B4-BE49-F238E27FC236}">
+                  <a16:creationId xmlns:a16="http://schemas.microsoft.com/office/drawing/2014/main" id="{8E30BF01-A6BD-9068-C04D-E67C219E9FDE}"/>
+                </a:ext>
+              </a:extLst>
+            </p:cNvPr>
+            <p:cNvSpPr/>
+            <p:nvPr/>
+          </p:nvSpPr>
+          <p:spPr>
+            <a:xfrm>
+              <a:off x="7451124" y="1272746"/>
+              <a:ext cx="1272746" cy="667265"/>
+            </a:xfrm>
+            <a:prstGeom prst="roundRect">
+              <a:avLst/>
+            </a:prstGeom>
+            <a:solidFill>
+              <a:schemeClr val="accent1">
+                <a:lumMod val="60000"/>
+                <a:lumOff val="40000"/>
+              </a:schemeClr>
+            </a:solidFill>
+            <a:ln w="25400">
+              <a:solidFill>
+                <a:schemeClr val="accent1">
+                  <a:lumMod val="75000"/>
+                </a:schemeClr>
+              </a:solidFill>
+            </a:ln>
+          </p:spPr>
+          <p:style>
+            <a:lnRef idx="2">
+              <a:schemeClr val="accent1">
+                <a:shade val="50000"/>
+              </a:schemeClr>
+            </a:lnRef>
+            <a:fillRef idx="1">
+              <a:schemeClr val="accent1"/>
+            </a:fillRef>
+            <a:effectRef idx="0">
+              <a:schemeClr val="accent1"/>
+            </a:effectRef>
+            <a:fontRef idx="minor">
+              <a:schemeClr val="lt1"/>
+            </a:fontRef>
+          </p:style>
+          <p:txBody>
+            <a:bodyPr rtlCol="0" anchor="ctr"/>
+            <a:lstStyle/>
+            <a:p>
+              <a:pPr algn="ctr"/>
+              <a:endParaRPr lang="en-DE"/>
+            </a:p>
+          </p:txBody>
+        </p:sp>
+        <p:sp>
+          <p:nvSpPr>
+            <p:cNvPr id="28" name="TextBox 27">
+              <a:extLst>
+                <a:ext uri="{FF2B5EF4-FFF2-40B4-BE49-F238E27FC236}">
+                  <a16:creationId xmlns:a16="http://schemas.microsoft.com/office/drawing/2014/main" id="{13428013-4402-5F90-6CDF-F05C0185D73D}"/>
+                </a:ext>
+              </a:extLst>
+            </p:cNvPr>
+            <p:cNvSpPr txBox="1"/>
+            <p:nvPr/>
+          </p:nvSpPr>
+          <p:spPr>
+            <a:xfrm>
+              <a:off x="7408981" y="1421712"/>
+              <a:ext cx="1357038" cy="369332"/>
+            </a:xfrm>
+            <a:prstGeom prst="rect">
+              <a:avLst/>
+            </a:prstGeom>
+            <a:noFill/>
+          </p:spPr>
+          <p:txBody>
+            <a:bodyPr wrap="none" rtlCol="0">
+              <a:spAutoFit/>
+            </a:bodyPr>
+            <a:lstStyle/>
+            <a:p>
+              <a:pPr algn="ctr"/>
+              <a:r>
+                <a:rPr lang="en-US" dirty="0" err="1"/>
+                <a:t>NodeState</a:t>
+              </a:r>
+              <a:r>
+                <a:rPr lang="en-US" dirty="0"/>
+                <a:t> A</a:t>
+              </a:r>
+              <a:endParaRPr lang="en-DE" dirty="0"/>
+            </a:p>
+          </p:txBody>
+        </p:sp>
+      </p:grpSp>
+      <p:grpSp>
+        <p:nvGrpSpPr>
+          <p:cNvPr id="29" name="Group 28">
+            <a:extLst>
+              <a:ext uri="{FF2B5EF4-FFF2-40B4-BE49-F238E27FC236}">
+                <a16:creationId xmlns:a16="http://schemas.microsoft.com/office/drawing/2014/main" id="{41E5C7F3-A542-212B-A7C3-C6AAE8373429}"/>
+              </a:ext>
+            </a:extLst>
+          </p:cNvPr>
+          <p:cNvGrpSpPr/>
+          <p:nvPr/>
+        </p:nvGrpSpPr>
+        <p:grpSpPr>
+          <a:xfrm>
+            <a:off x="4634648" y="3685640"/>
+            <a:ext cx="1336431" cy="715108"/>
+            <a:chOff x="2872154" y="1817077"/>
+            <a:chExt cx="1336431" cy="715108"/>
+          </a:xfrm>
+        </p:grpSpPr>
+        <p:sp>
+          <p:nvSpPr>
+            <p:cNvPr id="30" name="Oval 29">
+              <a:extLst>
+                <a:ext uri="{FF2B5EF4-FFF2-40B4-BE49-F238E27FC236}">
+                  <a16:creationId xmlns:a16="http://schemas.microsoft.com/office/drawing/2014/main" id="{D45D9B7D-89FC-E9ED-113D-48E49F8272AC}"/>
+                </a:ext>
+              </a:extLst>
+            </p:cNvPr>
+            <p:cNvSpPr/>
+            <p:nvPr/>
+          </p:nvSpPr>
+          <p:spPr>
+            <a:xfrm>
+              <a:off x="2872154" y="1817077"/>
+              <a:ext cx="1336431" cy="715108"/>
+            </a:xfrm>
+            <a:prstGeom prst="ellipse">
+              <a:avLst/>
+            </a:prstGeom>
+            <a:solidFill>
+              <a:schemeClr val="accent4"/>
+            </a:solidFill>
+            <a:ln w="25400">
+              <a:solidFill>
+                <a:schemeClr val="accent4">
+                  <a:lumMod val="50000"/>
+                </a:schemeClr>
+              </a:solidFill>
+            </a:ln>
+          </p:spPr>
+          <p:style>
+            <a:lnRef idx="2">
+              <a:schemeClr val="accent1">
+                <a:shade val="50000"/>
+              </a:schemeClr>
+            </a:lnRef>
+            <a:fillRef idx="1">
+              <a:schemeClr val="accent1"/>
+            </a:fillRef>
+            <a:effectRef idx="0">
+              <a:schemeClr val="accent1"/>
+            </a:effectRef>
+            <a:fontRef idx="minor">
+              <a:schemeClr val="lt1"/>
+            </a:fontRef>
+          </p:style>
+          <p:txBody>
+            <a:bodyPr rtlCol="0" anchor="ctr"/>
+            <a:lstStyle/>
+            <a:p>
+              <a:pPr algn="ctr"/>
+              <a:endParaRPr lang="en-DE"/>
+            </a:p>
+          </p:txBody>
+        </p:sp>
+        <p:sp>
+          <p:nvSpPr>
+            <p:cNvPr id="31" name="TextBox 30">
+              <a:extLst>
+                <a:ext uri="{FF2B5EF4-FFF2-40B4-BE49-F238E27FC236}">
+                  <a16:creationId xmlns:a16="http://schemas.microsoft.com/office/drawing/2014/main" id="{C40A6134-29BC-AC76-1074-0FBE95F99C5D}"/>
+                </a:ext>
+              </a:extLst>
+            </p:cNvPr>
+            <p:cNvSpPr txBox="1"/>
+            <p:nvPr/>
+          </p:nvSpPr>
+          <p:spPr>
+            <a:xfrm>
+              <a:off x="3017886" y="1851466"/>
+              <a:ext cx="1044966" cy="646331"/>
+            </a:xfrm>
+            <a:prstGeom prst="rect">
+              <a:avLst/>
+            </a:prstGeom>
+            <a:noFill/>
+          </p:spPr>
+          <p:txBody>
+            <a:bodyPr wrap="none" rtlCol="0">
+              <a:spAutoFit/>
+            </a:bodyPr>
+            <a:lstStyle/>
+            <a:p>
+              <a:pPr algn="ctr"/>
+              <a:r>
+                <a:rPr lang="en-US" dirty="0"/>
+                <a:t>Updating</a:t>
+              </a:r>
+            </a:p>
+            <a:p>
+              <a:pPr algn="ctr"/>
+              <a:r>
+                <a:rPr lang="en-US" dirty="0"/>
+                <a:t>Phase A</a:t>
+              </a:r>
+              <a:endParaRPr lang="en-DE" dirty="0"/>
+            </a:p>
+          </p:txBody>
+        </p:sp>
+      </p:grpSp>
+      <p:grpSp>
+        <p:nvGrpSpPr>
+          <p:cNvPr id="32" name="Group 31">
+            <a:extLst>
+              <a:ext uri="{FF2B5EF4-FFF2-40B4-BE49-F238E27FC236}">
+                <a16:creationId xmlns:a16="http://schemas.microsoft.com/office/drawing/2014/main" id="{3D013288-7CAF-F2D2-6B7D-8F23757F5911}"/>
+              </a:ext>
+            </a:extLst>
+          </p:cNvPr>
+          <p:cNvGrpSpPr/>
+          <p:nvPr/>
+        </p:nvGrpSpPr>
+        <p:grpSpPr>
+          <a:xfrm>
+            <a:off x="1460819" y="3709562"/>
+            <a:ext cx="1272746" cy="667265"/>
+            <a:chOff x="7451124" y="1272746"/>
+            <a:chExt cx="1272746" cy="667265"/>
+          </a:xfrm>
+        </p:grpSpPr>
+        <p:sp>
+          <p:nvSpPr>
+            <p:cNvPr id="33" name="Rectangle: Rounded Corners 32">
+              <a:extLst>
+                <a:ext uri="{FF2B5EF4-FFF2-40B4-BE49-F238E27FC236}">
+                  <a16:creationId xmlns:a16="http://schemas.microsoft.com/office/drawing/2014/main" id="{E0330A50-EAC5-541C-44B4-AE3F07AAAA8D}"/>
+                </a:ext>
+              </a:extLst>
+            </p:cNvPr>
+            <p:cNvSpPr/>
+            <p:nvPr/>
+          </p:nvSpPr>
+          <p:spPr>
+            <a:xfrm>
+              <a:off x="7451124" y="1272746"/>
+              <a:ext cx="1272746" cy="667265"/>
+            </a:xfrm>
+            <a:prstGeom prst="roundRect">
+              <a:avLst/>
+            </a:prstGeom>
+            <a:solidFill>
+              <a:schemeClr val="accent1">
+                <a:lumMod val="40000"/>
+                <a:lumOff val="60000"/>
+              </a:schemeClr>
+            </a:solidFill>
+            <a:ln w="25400">
+              <a:solidFill>
+                <a:schemeClr val="accent1">
+                  <a:lumMod val="75000"/>
+                </a:schemeClr>
+              </a:solidFill>
+            </a:ln>
+          </p:spPr>
+          <p:style>
+            <a:lnRef idx="2">
+              <a:schemeClr val="accent1">
+                <a:shade val="50000"/>
+              </a:schemeClr>
+            </a:lnRef>
+            <a:fillRef idx="1">
+              <a:schemeClr val="accent1"/>
+            </a:fillRef>
+            <a:effectRef idx="0">
+              <a:schemeClr val="accent1"/>
+            </a:effectRef>
+            <a:fontRef idx="minor">
+              <a:schemeClr val="lt1"/>
+            </a:fontRef>
+          </p:style>
+          <p:txBody>
+            <a:bodyPr rtlCol="0" anchor="ctr"/>
+            <a:lstStyle/>
+            <a:p>
+              <a:pPr algn="ctr"/>
+              <a:endParaRPr lang="en-DE"/>
+            </a:p>
+          </p:txBody>
+        </p:sp>
+        <p:sp>
+          <p:nvSpPr>
+            <p:cNvPr id="34" name="TextBox 33">
+              <a:extLst>
+                <a:ext uri="{FF2B5EF4-FFF2-40B4-BE49-F238E27FC236}">
+                  <a16:creationId xmlns:a16="http://schemas.microsoft.com/office/drawing/2014/main" id="{B17F18E5-6E04-6EBA-7B36-FC7B0354E63D}"/>
+                </a:ext>
+              </a:extLst>
+            </p:cNvPr>
+            <p:cNvSpPr txBox="1"/>
+            <p:nvPr/>
+          </p:nvSpPr>
+          <p:spPr>
+            <a:xfrm>
+              <a:off x="7648113" y="1421712"/>
+              <a:ext cx="878767" cy="369332"/>
+            </a:xfrm>
+            <a:prstGeom prst="rect">
+              <a:avLst/>
+            </a:prstGeom>
+            <a:noFill/>
+          </p:spPr>
+          <p:txBody>
+            <a:bodyPr wrap="none" rtlCol="0">
+              <a:spAutoFit/>
+            </a:bodyPr>
+            <a:lstStyle/>
+            <a:p>
+              <a:pPr algn="ctr"/>
+              <a:r>
+                <a:rPr lang="en-US" dirty="0"/>
+                <a:t>Node A</a:t>
+              </a:r>
+              <a:endParaRPr lang="en-DE" dirty="0"/>
+            </a:p>
+          </p:txBody>
+        </p:sp>
+      </p:grpSp>
+      <p:grpSp>
+        <p:nvGrpSpPr>
+          <p:cNvPr id="35" name="Group 34">
+            <a:extLst>
+              <a:ext uri="{FF2B5EF4-FFF2-40B4-BE49-F238E27FC236}">
+                <a16:creationId xmlns:a16="http://schemas.microsoft.com/office/drawing/2014/main" id="{20E2DD3B-29B5-A1FC-911E-01776DA4A761}"/>
+              </a:ext>
+            </a:extLst>
+          </p:cNvPr>
+          <p:cNvGrpSpPr/>
+          <p:nvPr/>
+        </p:nvGrpSpPr>
+        <p:grpSpPr>
+          <a:xfrm>
+            <a:off x="8154158" y="4718664"/>
+            <a:ext cx="1349024" cy="667265"/>
+            <a:chOff x="7412988" y="1272746"/>
+            <a:chExt cx="1349024" cy="667265"/>
+          </a:xfrm>
+        </p:grpSpPr>
+        <p:sp>
+          <p:nvSpPr>
+            <p:cNvPr id="36" name="Rectangle: Rounded Corners 35">
+              <a:extLst>
+                <a:ext uri="{FF2B5EF4-FFF2-40B4-BE49-F238E27FC236}">
+                  <a16:creationId xmlns:a16="http://schemas.microsoft.com/office/drawing/2014/main" id="{2412E0A8-51E4-92EE-C76A-99AE05E03321}"/>
+                </a:ext>
+              </a:extLst>
+            </p:cNvPr>
+            <p:cNvSpPr/>
+            <p:nvPr/>
+          </p:nvSpPr>
+          <p:spPr>
+            <a:xfrm>
+              <a:off x="7451124" y="1272746"/>
+              <a:ext cx="1272746" cy="667265"/>
+            </a:xfrm>
+            <a:prstGeom prst="roundRect">
+              <a:avLst/>
+            </a:prstGeom>
+            <a:solidFill>
+              <a:schemeClr val="accent1">
+                <a:lumMod val="60000"/>
+                <a:lumOff val="40000"/>
+              </a:schemeClr>
+            </a:solidFill>
+            <a:ln w="25400">
+              <a:solidFill>
+                <a:schemeClr val="accent1">
+                  <a:lumMod val="75000"/>
+                </a:schemeClr>
+              </a:solidFill>
+            </a:ln>
+          </p:spPr>
+          <p:style>
+            <a:lnRef idx="2">
+              <a:schemeClr val="accent1">
+                <a:shade val="50000"/>
+              </a:schemeClr>
+            </a:lnRef>
+            <a:fillRef idx="1">
+              <a:schemeClr val="accent1"/>
+            </a:fillRef>
+            <a:effectRef idx="0">
+              <a:schemeClr val="accent1"/>
+            </a:effectRef>
+            <a:fontRef idx="minor">
+              <a:schemeClr val="lt1"/>
+            </a:fontRef>
+          </p:style>
+          <p:txBody>
+            <a:bodyPr rtlCol="0" anchor="ctr"/>
+            <a:lstStyle/>
+            <a:p>
+              <a:pPr algn="ctr"/>
+              <a:endParaRPr lang="en-DE"/>
+            </a:p>
+          </p:txBody>
+        </p:sp>
+        <p:sp>
+          <p:nvSpPr>
+            <p:cNvPr id="37" name="TextBox 36">
+              <a:extLst>
+                <a:ext uri="{FF2B5EF4-FFF2-40B4-BE49-F238E27FC236}">
+                  <a16:creationId xmlns:a16="http://schemas.microsoft.com/office/drawing/2014/main" id="{07CEBD8C-D307-0AE5-793F-07D12BC03844}"/>
+                </a:ext>
+              </a:extLst>
+            </p:cNvPr>
+            <p:cNvSpPr txBox="1"/>
+            <p:nvPr/>
+          </p:nvSpPr>
+          <p:spPr>
+            <a:xfrm>
+              <a:off x="7412988" y="1421712"/>
+              <a:ext cx="1349024" cy="369332"/>
+            </a:xfrm>
+            <a:prstGeom prst="rect">
+              <a:avLst/>
+            </a:prstGeom>
+            <a:noFill/>
+          </p:spPr>
+          <p:txBody>
+            <a:bodyPr wrap="none" rtlCol="0">
+              <a:spAutoFit/>
+            </a:bodyPr>
+            <a:lstStyle/>
+            <a:p>
+              <a:pPr algn="ctr"/>
+              <a:r>
+                <a:rPr lang="en-US" dirty="0" err="1"/>
+                <a:t>NodeState</a:t>
+              </a:r>
+              <a:r>
+                <a:rPr lang="en-US" dirty="0"/>
+                <a:t> B</a:t>
+              </a:r>
+              <a:endParaRPr lang="en-DE" dirty="0"/>
+            </a:p>
+          </p:txBody>
+        </p:sp>
+      </p:grpSp>
+      <p:grpSp>
+        <p:nvGrpSpPr>
+          <p:cNvPr id="38" name="Group 37">
+            <a:extLst>
+              <a:ext uri="{FF2B5EF4-FFF2-40B4-BE49-F238E27FC236}">
+                <a16:creationId xmlns:a16="http://schemas.microsoft.com/office/drawing/2014/main" id="{0FEC06EC-DA16-3D0E-E238-1DF5D5B76A25}"/>
+              </a:ext>
+            </a:extLst>
+          </p:cNvPr>
+          <p:cNvGrpSpPr/>
+          <p:nvPr/>
+        </p:nvGrpSpPr>
+        <p:grpSpPr>
+          <a:xfrm>
+            <a:off x="3549063" y="4694742"/>
+            <a:ext cx="1336431" cy="715108"/>
+            <a:chOff x="2872154" y="1817077"/>
+            <a:chExt cx="1336431" cy="715108"/>
+          </a:xfrm>
+        </p:grpSpPr>
+        <p:sp>
+          <p:nvSpPr>
+            <p:cNvPr id="39" name="Oval 38">
+              <a:extLst>
+                <a:ext uri="{FF2B5EF4-FFF2-40B4-BE49-F238E27FC236}">
+                  <a16:creationId xmlns:a16="http://schemas.microsoft.com/office/drawing/2014/main" id="{18337039-A7F5-50D4-143F-77C017D50FC1}"/>
+                </a:ext>
+              </a:extLst>
+            </p:cNvPr>
+            <p:cNvSpPr/>
+            <p:nvPr/>
+          </p:nvSpPr>
+          <p:spPr>
+            <a:xfrm>
+              <a:off x="2872154" y="1817077"/>
+              <a:ext cx="1336431" cy="715108"/>
+            </a:xfrm>
+            <a:prstGeom prst="ellipse">
+              <a:avLst/>
+            </a:prstGeom>
+            <a:solidFill>
+              <a:schemeClr val="accent4"/>
+            </a:solidFill>
+            <a:ln w="25400">
+              <a:solidFill>
+                <a:schemeClr val="accent4">
+                  <a:lumMod val="50000"/>
+                </a:schemeClr>
+              </a:solidFill>
+            </a:ln>
+          </p:spPr>
+          <p:style>
+            <a:lnRef idx="2">
+              <a:schemeClr val="accent1">
+                <a:shade val="50000"/>
+              </a:schemeClr>
+            </a:lnRef>
+            <a:fillRef idx="1">
+              <a:schemeClr val="accent1"/>
+            </a:fillRef>
+            <a:effectRef idx="0">
+              <a:schemeClr val="accent1"/>
+            </a:effectRef>
+            <a:fontRef idx="minor">
+              <a:schemeClr val="lt1"/>
+            </a:fontRef>
+          </p:style>
+          <p:txBody>
+            <a:bodyPr rtlCol="0" anchor="ctr"/>
+            <a:lstStyle/>
+            <a:p>
+              <a:pPr algn="ctr"/>
+              <a:endParaRPr lang="en-DE"/>
+            </a:p>
+          </p:txBody>
+        </p:sp>
+        <p:sp>
+          <p:nvSpPr>
+            <p:cNvPr id="40" name="TextBox 39">
+              <a:extLst>
+                <a:ext uri="{FF2B5EF4-FFF2-40B4-BE49-F238E27FC236}">
+                  <a16:creationId xmlns:a16="http://schemas.microsoft.com/office/drawing/2014/main" id="{3BDA7FDC-7474-6BA5-EF42-3B4C1C833A70}"/>
+                </a:ext>
+              </a:extLst>
+            </p:cNvPr>
+            <p:cNvSpPr txBox="1"/>
+            <p:nvPr/>
+          </p:nvSpPr>
+          <p:spPr>
+            <a:xfrm>
+              <a:off x="3017886" y="1851466"/>
+              <a:ext cx="1044966" cy="646331"/>
+            </a:xfrm>
+            <a:prstGeom prst="rect">
+              <a:avLst/>
+            </a:prstGeom>
+            <a:noFill/>
+          </p:spPr>
+          <p:txBody>
+            <a:bodyPr wrap="none" rtlCol="0">
+              <a:spAutoFit/>
+            </a:bodyPr>
+            <a:lstStyle/>
+            <a:p>
+              <a:pPr algn="ctr"/>
+              <a:r>
+                <a:rPr lang="en-US" dirty="0"/>
+                <a:t>Updating</a:t>
+              </a:r>
+            </a:p>
+            <a:p>
+              <a:pPr algn="ctr"/>
+              <a:r>
+                <a:rPr lang="en-US" dirty="0"/>
+                <a:t>Phase B</a:t>
+              </a:r>
+              <a:endParaRPr lang="en-DE" dirty="0"/>
+            </a:p>
+          </p:txBody>
+        </p:sp>
+      </p:grpSp>
+      <p:grpSp>
+        <p:nvGrpSpPr>
+          <p:cNvPr id="41" name="Group 40">
+            <a:extLst>
+              <a:ext uri="{FF2B5EF4-FFF2-40B4-BE49-F238E27FC236}">
+                <a16:creationId xmlns:a16="http://schemas.microsoft.com/office/drawing/2014/main" id="{91B84AB1-D712-605A-DFF8-A16E00DC7F51}"/>
+              </a:ext>
+            </a:extLst>
+          </p:cNvPr>
+          <p:cNvGrpSpPr/>
+          <p:nvPr/>
+        </p:nvGrpSpPr>
+        <p:grpSpPr>
+          <a:xfrm>
+            <a:off x="1466266" y="4718664"/>
+            <a:ext cx="1272746" cy="667265"/>
+            <a:chOff x="7451124" y="1272746"/>
+            <a:chExt cx="1272746" cy="667265"/>
+          </a:xfrm>
+        </p:grpSpPr>
+        <p:sp>
+          <p:nvSpPr>
+            <p:cNvPr id="42" name="Rectangle: Rounded Corners 41">
+              <a:extLst>
+                <a:ext uri="{FF2B5EF4-FFF2-40B4-BE49-F238E27FC236}">
+                  <a16:creationId xmlns:a16="http://schemas.microsoft.com/office/drawing/2014/main" id="{1B23AB1F-04F7-ED00-2B23-DB1A5A484800}"/>
+                </a:ext>
+              </a:extLst>
+            </p:cNvPr>
+            <p:cNvSpPr/>
+            <p:nvPr/>
+          </p:nvSpPr>
+          <p:spPr>
+            <a:xfrm>
+              <a:off x="7451124" y="1272746"/>
+              <a:ext cx="1272746" cy="667265"/>
+            </a:xfrm>
+            <a:prstGeom prst="roundRect">
+              <a:avLst/>
+            </a:prstGeom>
+            <a:solidFill>
+              <a:schemeClr val="accent1">
+                <a:lumMod val="40000"/>
+                <a:lumOff val="60000"/>
+              </a:schemeClr>
+            </a:solidFill>
+            <a:ln w="25400">
+              <a:solidFill>
+                <a:schemeClr val="accent1">
+                  <a:lumMod val="75000"/>
+                </a:schemeClr>
+              </a:solidFill>
+            </a:ln>
+          </p:spPr>
+          <p:style>
+            <a:lnRef idx="2">
+              <a:schemeClr val="accent1">
+                <a:shade val="50000"/>
+              </a:schemeClr>
+            </a:lnRef>
+            <a:fillRef idx="1">
+              <a:schemeClr val="accent1"/>
+            </a:fillRef>
+            <a:effectRef idx="0">
+              <a:schemeClr val="accent1"/>
+            </a:effectRef>
+            <a:fontRef idx="minor">
+              <a:schemeClr val="lt1"/>
+            </a:fontRef>
+          </p:style>
+          <p:txBody>
+            <a:bodyPr rtlCol="0" anchor="ctr"/>
+            <a:lstStyle/>
+            <a:p>
+              <a:pPr algn="ctr"/>
+              <a:endParaRPr lang="en-DE"/>
+            </a:p>
+          </p:txBody>
+        </p:sp>
+        <p:sp>
+          <p:nvSpPr>
+            <p:cNvPr id="43" name="TextBox 42">
+              <a:extLst>
+                <a:ext uri="{FF2B5EF4-FFF2-40B4-BE49-F238E27FC236}">
+                  <a16:creationId xmlns:a16="http://schemas.microsoft.com/office/drawing/2014/main" id="{4875EDBE-3E33-1E83-F42F-F001C8DEE575}"/>
+                </a:ext>
+              </a:extLst>
+            </p:cNvPr>
+            <p:cNvSpPr txBox="1"/>
+            <p:nvPr/>
+          </p:nvSpPr>
+          <p:spPr>
+            <a:xfrm>
+              <a:off x="7652121" y="1421712"/>
+              <a:ext cx="870752" cy="369332"/>
+            </a:xfrm>
+            <a:prstGeom prst="rect">
+              <a:avLst/>
+            </a:prstGeom>
+            <a:noFill/>
+          </p:spPr>
+          <p:txBody>
+            <a:bodyPr wrap="none" rtlCol="0">
+              <a:spAutoFit/>
+            </a:bodyPr>
+            <a:lstStyle/>
+            <a:p>
+              <a:pPr algn="ctr"/>
+              <a:r>
+                <a:rPr lang="en-US" dirty="0"/>
+                <a:t>Node B</a:t>
+              </a:r>
+              <a:endParaRPr lang="en-DE" dirty="0"/>
+            </a:p>
+          </p:txBody>
+        </p:sp>
+      </p:grpSp>
+      <p:grpSp>
+        <p:nvGrpSpPr>
+          <p:cNvPr id="44" name="Group 43">
+            <a:extLst>
+              <a:ext uri="{FF2B5EF4-FFF2-40B4-BE49-F238E27FC236}">
+                <a16:creationId xmlns:a16="http://schemas.microsoft.com/office/drawing/2014/main" id="{C596A07E-3715-4E79-DCB5-400D318559C5}"/>
+              </a:ext>
+            </a:extLst>
+          </p:cNvPr>
+          <p:cNvGrpSpPr/>
+          <p:nvPr/>
+        </p:nvGrpSpPr>
+        <p:grpSpPr>
+          <a:xfrm>
+            <a:off x="8187648" y="5751687"/>
+            <a:ext cx="1347421" cy="667265"/>
+            <a:chOff x="7413789" y="1272746"/>
+            <a:chExt cx="1347421" cy="667265"/>
+          </a:xfrm>
+        </p:grpSpPr>
+        <p:sp>
+          <p:nvSpPr>
+            <p:cNvPr id="45" name="Rectangle: Rounded Corners 44">
+              <a:extLst>
+                <a:ext uri="{FF2B5EF4-FFF2-40B4-BE49-F238E27FC236}">
+                  <a16:creationId xmlns:a16="http://schemas.microsoft.com/office/drawing/2014/main" id="{5E6FFC21-2C9F-C72C-2E5B-4DAB48222B1B}"/>
+                </a:ext>
+              </a:extLst>
+            </p:cNvPr>
+            <p:cNvSpPr/>
+            <p:nvPr/>
+          </p:nvSpPr>
+          <p:spPr>
+            <a:xfrm>
+              <a:off x="7451124" y="1272746"/>
+              <a:ext cx="1272746" cy="667265"/>
+            </a:xfrm>
+            <a:prstGeom prst="roundRect">
+              <a:avLst/>
+            </a:prstGeom>
+            <a:solidFill>
+              <a:schemeClr val="accent1">
+                <a:lumMod val="60000"/>
+                <a:lumOff val="40000"/>
+              </a:schemeClr>
+            </a:solidFill>
+            <a:ln w="25400">
+              <a:solidFill>
+                <a:schemeClr val="accent1">
+                  <a:lumMod val="75000"/>
+                </a:schemeClr>
+              </a:solidFill>
+            </a:ln>
+          </p:spPr>
+          <p:style>
+            <a:lnRef idx="2">
+              <a:schemeClr val="accent1">
+                <a:shade val="50000"/>
+              </a:schemeClr>
+            </a:lnRef>
+            <a:fillRef idx="1">
+              <a:schemeClr val="accent1"/>
+            </a:fillRef>
+            <a:effectRef idx="0">
+              <a:schemeClr val="accent1"/>
+            </a:effectRef>
+            <a:fontRef idx="minor">
+              <a:schemeClr val="lt1"/>
+            </a:fontRef>
+          </p:style>
+          <p:txBody>
+            <a:bodyPr rtlCol="0" anchor="ctr"/>
+            <a:lstStyle/>
+            <a:p>
+              <a:pPr algn="ctr"/>
+              <a:endParaRPr lang="en-DE"/>
+            </a:p>
+          </p:txBody>
+        </p:sp>
+        <p:sp>
+          <p:nvSpPr>
+            <p:cNvPr id="46" name="TextBox 45">
+              <a:extLst>
+                <a:ext uri="{FF2B5EF4-FFF2-40B4-BE49-F238E27FC236}">
+                  <a16:creationId xmlns:a16="http://schemas.microsoft.com/office/drawing/2014/main" id="{645DBC61-5E7E-B15E-0A53-69856D9C42B4}"/>
+                </a:ext>
+              </a:extLst>
+            </p:cNvPr>
+            <p:cNvSpPr txBox="1"/>
+            <p:nvPr/>
+          </p:nvSpPr>
+          <p:spPr>
+            <a:xfrm>
+              <a:off x="7413789" y="1421712"/>
+              <a:ext cx="1347421" cy="369332"/>
+            </a:xfrm>
+            <a:prstGeom prst="rect">
+              <a:avLst/>
+            </a:prstGeom>
+            <a:noFill/>
+          </p:spPr>
+          <p:txBody>
+            <a:bodyPr wrap="none" rtlCol="0">
+              <a:spAutoFit/>
+            </a:bodyPr>
+            <a:lstStyle/>
+            <a:p>
+              <a:pPr algn="ctr"/>
+              <a:r>
+                <a:rPr lang="en-US" dirty="0" err="1"/>
+                <a:t>NodeState</a:t>
+              </a:r>
+              <a:r>
+                <a:rPr lang="en-US" dirty="0"/>
+                <a:t> C</a:t>
+              </a:r>
+              <a:endParaRPr lang="en-DE" dirty="0"/>
+            </a:p>
+          </p:txBody>
+        </p:sp>
+      </p:grpSp>
+      <p:grpSp>
+        <p:nvGrpSpPr>
+          <p:cNvPr id="47" name="Group 46">
+            <a:extLst>
+              <a:ext uri="{FF2B5EF4-FFF2-40B4-BE49-F238E27FC236}">
+                <a16:creationId xmlns:a16="http://schemas.microsoft.com/office/drawing/2014/main" id="{EB5C2FA7-98BE-8961-8CF5-74F70FAD239F}"/>
+              </a:ext>
+            </a:extLst>
+          </p:cNvPr>
+          <p:cNvGrpSpPr/>
+          <p:nvPr/>
+        </p:nvGrpSpPr>
+        <p:grpSpPr>
+          <a:xfrm>
+            <a:off x="5971079" y="5727765"/>
+            <a:ext cx="1336431" cy="715108"/>
+            <a:chOff x="2872154" y="1817077"/>
+            <a:chExt cx="1336431" cy="715108"/>
+          </a:xfrm>
+        </p:grpSpPr>
+        <p:sp>
+          <p:nvSpPr>
+            <p:cNvPr id="48" name="Oval 47">
+              <a:extLst>
+                <a:ext uri="{FF2B5EF4-FFF2-40B4-BE49-F238E27FC236}">
+                  <a16:creationId xmlns:a16="http://schemas.microsoft.com/office/drawing/2014/main" id="{94BC578D-3D7A-E26B-CC18-7591B219FD45}"/>
+                </a:ext>
+              </a:extLst>
+            </p:cNvPr>
+            <p:cNvSpPr/>
+            <p:nvPr/>
+          </p:nvSpPr>
+          <p:spPr>
+            <a:xfrm>
+              <a:off x="2872154" y="1817077"/>
+              <a:ext cx="1336431" cy="715108"/>
+            </a:xfrm>
+            <a:prstGeom prst="ellipse">
+              <a:avLst/>
+            </a:prstGeom>
+            <a:solidFill>
+              <a:schemeClr val="accent4"/>
+            </a:solidFill>
+            <a:ln w="25400">
+              <a:solidFill>
+                <a:schemeClr val="accent4">
+                  <a:lumMod val="50000"/>
+                </a:schemeClr>
+              </a:solidFill>
+            </a:ln>
+          </p:spPr>
+          <p:style>
+            <a:lnRef idx="2">
+              <a:schemeClr val="accent1">
+                <a:shade val="50000"/>
+              </a:schemeClr>
+            </a:lnRef>
+            <a:fillRef idx="1">
+              <a:schemeClr val="accent1"/>
+            </a:fillRef>
+            <a:effectRef idx="0">
+              <a:schemeClr val="accent1"/>
+            </a:effectRef>
+            <a:fontRef idx="minor">
+              <a:schemeClr val="lt1"/>
+            </a:fontRef>
+          </p:style>
+          <p:txBody>
+            <a:bodyPr rtlCol="0" anchor="ctr"/>
+            <a:lstStyle/>
+            <a:p>
+              <a:pPr algn="ctr"/>
+              <a:endParaRPr lang="en-DE"/>
+            </a:p>
+          </p:txBody>
+        </p:sp>
+        <p:sp>
+          <p:nvSpPr>
+            <p:cNvPr id="49" name="TextBox 48">
+              <a:extLst>
+                <a:ext uri="{FF2B5EF4-FFF2-40B4-BE49-F238E27FC236}">
+                  <a16:creationId xmlns:a16="http://schemas.microsoft.com/office/drawing/2014/main" id="{C0A3EBB9-A84D-077E-2052-1E43B380EF60}"/>
+                </a:ext>
+              </a:extLst>
+            </p:cNvPr>
+            <p:cNvSpPr txBox="1"/>
+            <p:nvPr/>
+          </p:nvSpPr>
+          <p:spPr>
+            <a:xfrm>
+              <a:off x="3017886" y="1851466"/>
+              <a:ext cx="1044966" cy="646331"/>
+            </a:xfrm>
+            <a:prstGeom prst="rect">
+              <a:avLst/>
+            </a:prstGeom>
+            <a:noFill/>
+          </p:spPr>
+          <p:txBody>
+            <a:bodyPr wrap="none" rtlCol="0">
+              <a:spAutoFit/>
+            </a:bodyPr>
+            <a:lstStyle/>
+            <a:p>
+              <a:pPr algn="ctr"/>
+              <a:r>
+                <a:rPr lang="en-US" dirty="0"/>
+                <a:t>Updating</a:t>
+              </a:r>
+            </a:p>
+            <a:p>
+              <a:pPr algn="ctr"/>
+              <a:r>
+                <a:rPr lang="en-US" dirty="0"/>
+                <a:t>Phase C</a:t>
+              </a:r>
+              <a:endParaRPr lang="en-DE" dirty="0"/>
+            </a:p>
+          </p:txBody>
+        </p:sp>
+      </p:grpSp>
+      <p:grpSp>
+        <p:nvGrpSpPr>
+          <p:cNvPr id="50" name="Group 49">
+            <a:extLst>
+              <a:ext uri="{FF2B5EF4-FFF2-40B4-BE49-F238E27FC236}">
+                <a16:creationId xmlns:a16="http://schemas.microsoft.com/office/drawing/2014/main" id="{97E23638-D2CA-CDDE-ABC8-224C8A57096D}"/>
+              </a:ext>
+            </a:extLst>
+          </p:cNvPr>
+          <p:cNvGrpSpPr/>
+          <p:nvPr/>
+        </p:nvGrpSpPr>
+        <p:grpSpPr>
+          <a:xfrm>
+            <a:off x="1498955" y="5751687"/>
+            <a:ext cx="1272746" cy="667265"/>
+            <a:chOff x="7451124" y="1272746"/>
+            <a:chExt cx="1272746" cy="667265"/>
+          </a:xfrm>
+        </p:grpSpPr>
+        <p:sp>
+          <p:nvSpPr>
+            <p:cNvPr id="51" name="Rectangle: Rounded Corners 50">
+              <a:extLst>
+                <a:ext uri="{FF2B5EF4-FFF2-40B4-BE49-F238E27FC236}">
+                  <a16:creationId xmlns:a16="http://schemas.microsoft.com/office/drawing/2014/main" id="{B089B525-CC1E-0635-FA57-BB083FFB7FE7}"/>
+                </a:ext>
+              </a:extLst>
+            </p:cNvPr>
+            <p:cNvSpPr/>
+            <p:nvPr/>
+          </p:nvSpPr>
+          <p:spPr>
+            <a:xfrm>
+              <a:off x="7451124" y="1272746"/>
+              <a:ext cx="1272746" cy="667265"/>
+            </a:xfrm>
+            <a:prstGeom prst="roundRect">
+              <a:avLst/>
+            </a:prstGeom>
+            <a:solidFill>
+              <a:schemeClr val="accent1">
+                <a:lumMod val="40000"/>
+                <a:lumOff val="60000"/>
+              </a:schemeClr>
+            </a:solidFill>
+            <a:ln w="25400">
+              <a:solidFill>
+                <a:schemeClr val="accent1">
+                  <a:lumMod val="75000"/>
+                </a:schemeClr>
+              </a:solidFill>
+            </a:ln>
+          </p:spPr>
+          <p:style>
+            <a:lnRef idx="2">
+              <a:schemeClr val="accent1">
+                <a:shade val="50000"/>
+              </a:schemeClr>
+            </a:lnRef>
+            <a:fillRef idx="1">
+              <a:schemeClr val="accent1"/>
+            </a:fillRef>
+            <a:effectRef idx="0">
+              <a:schemeClr val="accent1"/>
+            </a:effectRef>
+            <a:fontRef idx="minor">
+              <a:schemeClr val="lt1"/>
+            </a:fontRef>
+          </p:style>
+          <p:txBody>
+            <a:bodyPr rtlCol="0" anchor="ctr"/>
+            <a:lstStyle/>
+            <a:p>
+              <a:pPr algn="ctr"/>
+              <a:endParaRPr lang="en-DE"/>
+            </a:p>
+          </p:txBody>
+        </p:sp>
+        <p:sp>
+          <p:nvSpPr>
+            <p:cNvPr id="52" name="TextBox 51">
+              <a:extLst>
+                <a:ext uri="{FF2B5EF4-FFF2-40B4-BE49-F238E27FC236}">
+                  <a16:creationId xmlns:a16="http://schemas.microsoft.com/office/drawing/2014/main" id="{F352EA24-A17F-D2DE-9758-5AC4F0740C43}"/>
+                </a:ext>
+              </a:extLst>
+            </p:cNvPr>
+            <p:cNvSpPr txBox="1"/>
+            <p:nvPr/>
+          </p:nvSpPr>
+          <p:spPr>
+            <a:xfrm>
+              <a:off x="7652922" y="1421712"/>
+              <a:ext cx="869149" cy="369332"/>
+            </a:xfrm>
+            <a:prstGeom prst="rect">
+              <a:avLst/>
+            </a:prstGeom>
+            <a:noFill/>
+          </p:spPr>
+          <p:txBody>
+            <a:bodyPr wrap="none" rtlCol="0">
+              <a:spAutoFit/>
+            </a:bodyPr>
+            <a:lstStyle/>
+            <a:p>
+              <a:pPr algn="ctr"/>
+              <a:r>
+                <a:rPr lang="en-US" dirty="0"/>
+                <a:t>Node C</a:t>
+              </a:r>
+              <a:endParaRPr lang="en-DE" dirty="0"/>
+            </a:p>
+          </p:txBody>
+        </p:sp>
+      </p:grpSp>
+      <p:cxnSp>
+        <p:nvCxnSpPr>
+          <p:cNvPr id="54" name="Straight Arrow Connector 53">
+            <a:extLst>
+              <a:ext uri="{FF2B5EF4-FFF2-40B4-BE49-F238E27FC236}">
+                <a16:creationId xmlns:a16="http://schemas.microsoft.com/office/drawing/2014/main" id="{3C530DFB-CCFA-319D-BFC4-3B1B49CE85B6}"/>
+              </a:ext>
+            </a:extLst>
+          </p:cNvPr>
+          <p:cNvCxnSpPr>
+            <a:stCxn id="40" idx="0"/>
+            <a:endCxn id="30" idx="4"/>
+          </p:cNvCxnSpPr>
+          <p:nvPr/>
+        </p:nvCxnSpPr>
+        <p:spPr>
+          <a:xfrm flipV="1">
+            <a:off x="4217278" y="4400748"/>
+            <a:ext cx="1085586" cy="328383"/>
+          </a:xfrm>
+          <a:prstGeom prst="straightConnector1">
+            <a:avLst/>
+          </a:prstGeom>
+          <a:ln w="25400">
+            <a:solidFill>
+              <a:schemeClr val="accent4">
+                <a:lumMod val="75000"/>
+              </a:schemeClr>
+            </a:solidFill>
+            <a:tailEnd type="triangle" w="lg" len="lg"/>
+          </a:ln>
+        </p:spPr>
+        <p:style>
+          <a:lnRef idx="1">
+            <a:schemeClr val="accent1"/>
+          </a:lnRef>
+          <a:fillRef idx="0">
+            <a:schemeClr val="accent1"/>
+          </a:fillRef>
+          <a:effectRef idx="0">
+            <a:schemeClr val="accent1"/>
+          </a:effectRef>
+          <a:fontRef idx="minor">
+            <a:schemeClr val="tx1"/>
+          </a:fontRef>
+        </p:style>
+      </p:cxnSp>
+      <p:cxnSp>
+        <p:nvCxnSpPr>
+          <p:cNvPr id="56" name="Straight Arrow Connector 55">
+            <a:extLst>
+              <a:ext uri="{FF2B5EF4-FFF2-40B4-BE49-F238E27FC236}">
+                <a16:creationId xmlns:a16="http://schemas.microsoft.com/office/drawing/2014/main" id="{37D24D73-09AF-69BF-7422-F03FDA591528}"/>
+              </a:ext>
+            </a:extLst>
+          </p:cNvPr>
+          <p:cNvCxnSpPr>
+            <a:stCxn id="48" idx="0"/>
+            <a:endCxn id="30" idx="4"/>
+          </p:cNvCxnSpPr>
+          <p:nvPr/>
+        </p:nvCxnSpPr>
+        <p:spPr>
+          <a:xfrm flipH="1" flipV="1">
+            <a:off x="5302864" y="4400748"/>
+            <a:ext cx="1336431" cy="1327017"/>
+          </a:xfrm>
+          <a:prstGeom prst="straightConnector1">
+            <a:avLst/>
+          </a:prstGeom>
+          <a:ln w="25400">
+            <a:solidFill>
+              <a:schemeClr val="accent4">
+                <a:lumMod val="75000"/>
+              </a:schemeClr>
+            </a:solidFill>
+            <a:tailEnd type="triangle" w="lg" len="lg"/>
+          </a:ln>
+        </p:spPr>
+        <p:style>
+          <a:lnRef idx="1">
+            <a:schemeClr val="accent1"/>
+          </a:lnRef>
+          <a:fillRef idx="0">
+            <a:schemeClr val="accent1"/>
+          </a:fillRef>
+          <a:effectRef idx="0">
+            <a:schemeClr val="accent1"/>
+          </a:effectRef>
+          <a:fontRef idx="minor">
+            <a:schemeClr val="tx1"/>
+          </a:fontRef>
+        </p:style>
+      </p:cxnSp>
+      <p:cxnSp>
+        <p:nvCxnSpPr>
+          <p:cNvPr id="57" name="Straight Arrow Connector 56">
+            <a:extLst>
+              <a:ext uri="{FF2B5EF4-FFF2-40B4-BE49-F238E27FC236}">
+                <a16:creationId xmlns:a16="http://schemas.microsoft.com/office/drawing/2014/main" id="{7BE06815-3167-A919-7E57-7E7FFEA56C69}"/>
+              </a:ext>
+            </a:extLst>
+          </p:cNvPr>
+          <p:cNvCxnSpPr>
+            <a:cxnSpLocks/>
+            <a:stCxn id="33" idx="3"/>
+            <a:endCxn id="30" idx="2"/>
+          </p:cNvCxnSpPr>
+          <p:nvPr/>
+        </p:nvCxnSpPr>
+        <p:spPr>
+          <a:xfrm flipV="1">
+            <a:off x="2733565" y="4043194"/>
+            <a:ext cx="1901083" cy="1"/>
+          </a:xfrm>
+          <a:prstGeom prst="straightConnector1">
+            <a:avLst/>
+          </a:prstGeom>
+          <a:ln w="25400">
+            <a:solidFill>
+              <a:schemeClr val="accent1">
+                <a:lumMod val="40000"/>
+                <a:lumOff val="60000"/>
+              </a:schemeClr>
+            </a:solidFill>
+            <a:headEnd type="none"/>
+            <a:tailEnd type="arrow" w="lg" len="lg"/>
+          </a:ln>
+        </p:spPr>
+        <p:style>
+          <a:lnRef idx="1">
+            <a:schemeClr val="accent1"/>
+          </a:lnRef>
+          <a:fillRef idx="0">
+            <a:schemeClr val="accent1"/>
+          </a:fillRef>
+          <a:effectRef idx="0">
+            <a:schemeClr val="accent1"/>
+          </a:effectRef>
+          <a:fontRef idx="minor">
+            <a:schemeClr val="tx1"/>
+          </a:fontRef>
+        </p:style>
+      </p:cxnSp>
+      <p:cxnSp>
+        <p:nvCxnSpPr>
+          <p:cNvPr id="60" name="Straight Arrow Connector 59">
+            <a:extLst>
+              <a:ext uri="{FF2B5EF4-FFF2-40B4-BE49-F238E27FC236}">
+                <a16:creationId xmlns:a16="http://schemas.microsoft.com/office/drawing/2014/main" id="{3EE1C4C1-FA34-4494-EB65-FA791E7246BC}"/>
+              </a:ext>
+            </a:extLst>
+          </p:cNvPr>
+          <p:cNvCxnSpPr>
+            <a:cxnSpLocks/>
+            <a:stCxn id="42" idx="3"/>
+            <a:endCxn id="39" idx="2"/>
+          </p:cNvCxnSpPr>
+          <p:nvPr/>
+        </p:nvCxnSpPr>
+        <p:spPr>
+          <a:xfrm flipV="1">
+            <a:off x="2739012" y="5052296"/>
+            <a:ext cx="810051" cy="1"/>
+          </a:xfrm>
+          <a:prstGeom prst="straightConnector1">
+            <a:avLst/>
+          </a:prstGeom>
+          <a:ln w="25400">
+            <a:solidFill>
+              <a:schemeClr val="accent1">
+                <a:lumMod val="40000"/>
+                <a:lumOff val="60000"/>
+              </a:schemeClr>
+            </a:solidFill>
+            <a:headEnd type="none"/>
+            <a:tailEnd type="arrow" w="lg" len="lg"/>
+          </a:ln>
+        </p:spPr>
+        <p:style>
+          <a:lnRef idx="1">
+            <a:schemeClr val="accent1"/>
+          </a:lnRef>
+          <a:fillRef idx="0">
+            <a:schemeClr val="accent1"/>
+          </a:fillRef>
+          <a:effectRef idx="0">
+            <a:schemeClr val="accent1"/>
+          </a:effectRef>
+          <a:fontRef idx="minor">
+            <a:schemeClr val="tx1"/>
+          </a:fontRef>
+        </p:style>
+      </p:cxnSp>
+      <p:cxnSp>
+        <p:nvCxnSpPr>
+          <p:cNvPr id="63" name="Straight Arrow Connector 62">
+            <a:extLst>
+              <a:ext uri="{FF2B5EF4-FFF2-40B4-BE49-F238E27FC236}">
+                <a16:creationId xmlns:a16="http://schemas.microsoft.com/office/drawing/2014/main" id="{FF72E09B-A5F3-70BE-4F96-C43BDB975DB4}"/>
+              </a:ext>
+            </a:extLst>
+          </p:cNvPr>
+          <p:cNvCxnSpPr>
+            <a:cxnSpLocks/>
+            <a:stCxn id="51" idx="3"/>
+            <a:endCxn id="48" idx="2"/>
+          </p:cNvCxnSpPr>
+          <p:nvPr/>
+        </p:nvCxnSpPr>
+        <p:spPr>
+          <a:xfrm flipV="1">
+            <a:off x="2771701" y="6085319"/>
+            <a:ext cx="3199378" cy="1"/>
+          </a:xfrm>
+          <a:prstGeom prst="straightConnector1">
+            <a:avLst/>
+          </a:prstGeom>
+          <a:ln w="25400">
+            <a:solidFill>
+              <a:schemeClr val="accent1">
+                <a:lumMod val="40000"/>
+                <a:lumOff val="60000"/>
+              </a:schemeClr>
+            </a:solidFill>
+            <a:headEnd type="none"/>
+            <a:tailEnd type="arrow" w="lg" len="lg"/>
+          </a:ln>
+        </p:spPr>
+        <p:style>
+          <a:lnRef idx="1">
+            <a:schemeClr val="accent1"/>
+          </a:lnRef>
+          <a:fillRef idx="0">
+            <a:schemeClr val="accent1"/>
+          </a:fillRef>
+          <a:effectRef idx="0">
+            <a:schemeClr val="accent1"/>
+          </a:effectRef>
+          <a:fontRef idx="minor">
+            <a:schemeClr val="tx1"/>
+          </a:fontRef>
+        </p:style>
+      </p:cxnSp>
+      <p:cxnSp>
+        <p:nvCxnSpPr>
+          <p:cNvPr id="66" name="Straight Arrow Connector 65">
+            <a:extLst>
+              <a:ext uri="{FF2B5EF4-FFF2-40B4-BE49-F238E27FC236}">
+                <a16:creationId xmlns:a16="http://schemas.microsoft.com/office/drawing/2014/main" id="{2B6E76E7-8A4C-DF54-C385-7F484CFA7691}"/>
+              </a:ext>
+            </a:extLst>
+          </p:cNvPr>
+          <p:cNvCxnSpPr>
+            <a:cxnSpLocks/>
+            <a:stCxn id="48" idx="2"/>
+            <a:endCxn id="39" idx="5"/>
+          </p:cNvCxnSpPr>
+          <p:nvPr/>
+        </p:nvCxnSpPr>
+        <p:spPr>
+          <a:xfrm flipH="1" flipV="1">
+            <a:off x="4689778" y="5305125"/>
+            <a:ext cx="1281301" cy="780194"/>
+          </a:xfrm>
+          <a:prstGeom prst="straightConnector1">
+            <a:avLst/>
+          </a:prstGeom>
+          <a:ln w="25400">
+            <a:solidFill>
+              <a:schemeClr val="accent4">
+                <a:lumMod val="75000"/>
+              </a:schemeClr>
+            </a:solidFill>
+            <a:tailEnd type="triangle" w="lg" len="lg"/>
+          </a:ln>
+        </p:spPr>
+        <p:style>
+          <a:lnRef idx="1">
+            <a:schemeClr val="accent1"/>
+          </a:lnRef>
+          <a:fillRef idx="0">
+            <a:schemeClr val="accent1"/>
+          </a:fillRef>
+          <a:effectRef idx="0">
+            <a:schemeClr val="accent1"/>
+          </a:effectRef>
+          <a:fontRef idx="minor">
+            <a:schemeClr val="tx1"/>
+          </a:fontRef>
+        </p:style>
+      </p:cxnSp>
+    </p:spTree>
+    <p:extLst>
+      <p:ext uri="{BB962C8B-B14F-4D97-AF65-F5344CB8AC3E}">
+        <p14:creationId xmlns:p14="http://schemas.microsoft.com/office/powerpoint/2010/main" val="2724778371"/>
       </p:ext>
     </p:extLst>
   </p:cSld>
@@ -11083,21 +13874,21 @@
 </file>
 
 <file path=customXml/item1.xml><?xml version="1.0" encoding="utf-8"?>
+<TemplafyTemplateConfiguration><![CDATA[{"elementsMetadata":[],"transformationConfigurations":[],"templateName":"blankpresentation","templateDescription":"","enableDocumentContentUpdater":false,"version":"2.0"}]]></TemplafyTemplateConfiguration>
+</file>
+
+<file path=customXml/item2.xml><?xml version="1.0" encoding="utf-8"?>
 <TemplafyFormConfiguration><![CDATA[{"formFields":[],"formDataEntries":[]}]]></TemplafyFormConfiguration>
 </file>
 
-<file path=customXml/item2.xml><?xml version="1.0" encoding="utf-8"?>
-<TemplafyTemplateConfiguration><![CDATA[{"elementsMetadata":[],"transformationConfigurations":[],"templateName":"blankpresentation","templateDescription":"","enableDocumentContentUpdater":false,"version":"2.0"}]]></TemplafyTemplateConfiguration>
-</file>
-
 <file path=customXml/itemProps1.xml><?xml version="1.0" encoding="utf-8"?>
-<ds:datastoreItem xmlns:ds="http://schemas.openxmlformats.org/officeDocument/2006/customXml" ds:itemID="{21E4BB68-DBE0-4174-BF38-A8F24AA97E06}">
+<ds:datastoreItem xmlns:ds="http://schemas.openxmlformats.org/officeDocument/2006/customXml" ds:itemID="{1E5C1412-4B31-4EB2-BCFB-90DC85E0549F}">
   <ds:schemaRefs/>
 </ds:datastoreItem>
 </file>
 
 <file path=customXml/itemProps2.xml><?xml version="1.0" encoding="utf-8"?>
-<ds:datastoreItem xmlns:ds="http://schemas.openxmlformats.org/officeDocument/2006/customXml" ds:itemID="{1E5C1412-4B31-4EB2-BCFB-90DC85E0549F}">
+<ds:datastoreItem xmlns:ds="http://schemas.openxmlformats.org/officeDocument/2006/customXml" ds:itemID="{21E4BB68-DBE0-4174-BF38-A8F24AA97E06}">
   <ds:schemaRefs/>
 </ds:datastoreItem>
 </file>
</xml_diff>